<commit_message>
Sensor Rate Slowed to 1x Sec
</commit_message>
<xml_diff>
--- a/MWP.pptx
+++ b/MWP.pptx
@@ -7,6 +7,8 @@
   <p:sldIdLst>
     <p:sldId id="256" r:id="rId2"/>
     <p:sldId id="257" r:id="rId3"/>
+    <p:sldId id="258" r:id="rId4"/>
+    <p:sldId id="259" r:id="rId5"/>
   </p:sldIdLst>
   <p:sldSz cx="12192000" cy="6858000"/>
   <p:notesSz cx="6858000" cy="9144000"/>
@@ -260,7 +262,7 @@
           <a:p>
             <a:fld id="{FBDE9AF9-6803-3841-8B08-89EDB77F48DB}" type="datetimeFigureOut">
               <a:rPr lang="en-US" smtClean="0"/>
-              <a:t>10/22/24</a:t>
+              <a:t>11/18/24</a:t>
             </a:fld>
             <a:endParaRPr lang="en-US"/>
           </a:p>
@@ -458,7 +460,7 @@
           <a:p>
             <a:fld id="{FBDE9AF9-6803-3841-8B08-89EDB77F48DB}" type="datetimeFigureOut">
               <a:rPr lang="en-US" smtClean="0"/>
-              <a:t>10/22/24</a:t>
+              <a:t>11/18/24</a:t>
             </a:fld>
             <a:endParaRPr lang="en-US"/>
           </a:p>
@@ -666,7 +668,7 @@
           <a:p>
             <a:fld id="{FBDE9AF9-6803-3841-8B08-89EDB77F48DB}" type="datetimeFigureOut">
               <a:rPr lang="en-US" smtClean="0"/>
-              <a:t>10/22/24</a:t>
+              <a:t>11/18/24</a:t>
             </a:fld>
             <a:endParaRPr lang="en-US"/>
           </a:p>
@@ -864,7 +866,7 @@
           <a:p>
             <a:fld id="{FBDE9AF9-6803-3841-8B08-89EDB77F48DB}" type="datetimeFigureOut">
               <a:rPr lang="en-US" smtClean="0"/>
-              <a:t>10/22/24</a:t>
+              <a:t>11/18/24</a:t>
             </a:fld>
             <a:endParaRPr lang="en-US"/>
           </a:p>
@@ -1139,7 +1141,7 @@
           <a:p>
             <a:fld id="{FBDE9AF9-6803-3841-8B08-89EDB77F48DB}" type="datetimeFigureOut">
               <a:rPr lang="en-US" smtClean="0"/>
-              <a:t>10/22/24</a:t>
+              <a:t>11/18/24</a:t>
             </a:fld>
             <a:endParaRPr lang="en-US"/>
           </a:p>
@@ -1404,7 +1406,7 @@
           <a:p>
             <a:fld id="{FBDE9AF9-6803-3841-8B08-89EDB77F48DB}" type="datetimeFigureOut">
               <a:rPr lang="en-US" smtClean="0"/>
-              <a:t>10/22/24</a:t>
+              <a:t>11/18/24</a:t>
             </a:fld>
             <a:endParaRPr lang="en-US"/>
           </a:p>
@@ -1816,7 +1818,7 @@
           <a:p>
             <a:fld id="{FBDE9AF9-6803-3841-8B08-89EDB77F48DB}" type="datetimeFigureOut">
               <a:rPr lang="en-US" smtClean="0"/>
-              <a:t>10/22/24</a:t>
+              <a:t>11/18/24</a:t>
             </a:fld>
             <a:endParaRPr lang="en-US"/>
           </a:p>
@@ -1957,7 +1959,7 @@
           <a:p>
             <a:fld id="{FBDE9AF9-6803-3841-8B08-89EDB77F48DB}" type="datetimeFigureOut">
               <a:rPr lang="en-US" smtClean="0"/>
-              <a:t>10/22/24</a:t>
+              <a:t>11/18/24</a:t>
             </a:fld>
             <a:endParaRPr lang="en-US"/>
           </a:p>
@@ -2070,7 +2072,7 @@
           <a:p>
             <a:fld id="{FBDE9AF9-6803-3841-8B08-89EDB77F48DB}" type="datetimeFigureOut">
               <a:rPr lang="en-US" smtClean="0"/>
-              <a:t>10/22/24</a:t>
+              <a:t>11/18/24</a:t>
             </a:fld>
             <a:endParaRPr lang="en-US"/>
           </a:p>
@@ -2381,7 +2383,7 @@
           <a:p>
             <a:fld id="{FBDE9AF9-6803-3841-8B08-89EDB77F48DB}" type="datetimeFigureOut">
               <a:rPr lang="en-US" smtClean="0"/>
-              <a:t>10/22/24</a:t>
+              <a:t>11/18/24</a:t>
             </a:fld>
             <a:endParaRPr lang="en-US"/>
           </a:p>
@@ -2669,7 +2671,7 @@
           <a:p>
             <a:fld id="{FBDE9AF9-6803-3841-8B08-89EDB77F48DB}" type="datetimeFigureOut">
               <a:rPr lang="en-US" smtClean="0"/>
-              <a:t>10/22/24</a:t>
+              <a:t>11/18/24</a:t>
             </a:fld>
             <a:endParaRPr lang="en-US"/>
           </a:p>
@@ -2910,7 +2912,7 @@
           <a:p>
             <a:fld id="{FBDE9AF9-6803-3841-8B08-89EDB77F48DB}" type="datetimeFigureOut">
               <a:rPr lang="en-US" smtClean="0"/>
-              <a:t>10/22/24</a:t>
+              <a:t>11/18/24</a:t>
             </a:fld>
             <a:endParaRPr lang="en-US"/>
           </a:p>
@@ -10315,6 +10317,2597 @@
 </p:sld>
 </file>
 
+<file path=ppt/slides/slide3.xml><?xml version="1.0" encoding="utf-8"?>
+<p:sld xmlns:a="http://schemas.openxmlformats.org/drawingml/2006/main" xmlns:r="http://schemas.openxmlformats.org/officeDocument/2006/relationships" xmlns:p="http://schemas.openxmlformats.org/presentationml/2006/main">
+  <p:cSld>
+    <p:bg>
+      <p:bgPr>
+        <a:solidFill>
+          <a:schemeClr val="bg1"/>
+        </a:solidFill>
+        <a:effectLst/>
+      </p:bgPr>
+    </p:bg>
+    <p:spTree>
+      <p:nvGrpSpPr>
+        <p:cNvPr id="1" name="">
+          <a:extLst>
+            <a:ext uri="{FF2B5EF4-FFF2-40B4-BE49-F238E27FC236}">
+              <a16:creationId xmlns:a16="http://schemas.microsoft.com/office/drawing/2014/main" id="{92D58B0B-11BF-29AC-0C3B-F1FA647A6894}"/>
+            </a:ext>
+          </a:extLst>
+        </p:cNvPr>
+        <p:cNvGrpSpPr/>
+        <p:nvPr/>
+      </p:nvGrpSpPr>
+      <p:grpSpPr>
+        <a:xfrm>
+          <a:off x="0" y="0"/>
+          <a:ext cx="0" cy="0"/>
+          <a:chOff x="0" y="0"/>
+          <a:chExt cx="0" cy="0"/>
+        </a:xfrm>
+      </p:grpSpPr>
+      <p:pic>
+        <p:nvPicPr>
+          <p:cNvPr id="1026" name="Picture 2">
+            <a:extLst>
+              <a:ext uri="{FF2B5EF4-FFF2-40B4-BE49-F238E27FC236}">
+                <a16:creationId xmlns:a16="http://schemas.microsoft.com/office/drawing/2014/main" id="{5DE592F3-A201-84B4-E74B-B7BF55BFB229}"/>
+              </a:ext>
+            </a:extLst>
+          </p:cNvPr>
+          <p:cNvPicPr>
+            <a:picLocks noChangeAspect="1" noChangeArrowheads="1"/>
+          </p:cNvPicPr>
+          <p:nvPr/>
+        </p:nvPicPr>
+        <p:blipFill rotWithShape="1">
+          <a:blip r:embed="rId2">
+            <a:extLst>
+              <a:ext uri="{28A0092B-C50C-407E-A947-70E740481C1C}">
+                <a14:useLocalDpi xmlns:a14="http://schemas.microsoft.com/office/drawing/2010/main" val="0"/>
+              </a:ext>
+            </a:extLst>
+          </a:blip>
+          <a:srcRect t="25806" r="43369"/>
+          <a:stretch/>
+        </p:blipFill>
+        <p:spPr bwMode="auto">
+          <a:xfrm rot="16200000">
+            <a:off x="4030404" y="1637121"/>
+            <a:ext cx="3676957" cy="5088194"/>
+          </a:xfrm>
+          <a:prstGeom prst="rect">
+            <a:avLst/>
+          </a:prstGeom>
+          <a:noFill/>
+          <a:extLst>
+            <a:ext uri="{909E8E84-426E-40DD-AFC4-6F175D3DCCD1}">
+              <a14:hiddenFill xmlns:a14="http://schemas.microsoft.com/office/drawing/2010/main">
+                <a:solidFill>
+                  <a:srgbClr val="FFFFFF"/>
+                </a:solidFill>
+              </a14:hiddenFill>
+            </a:ext>
+          </a:extLst>
+        </p:spPr>
+      </p:pic>
+      <p:sp>
+        <p:nvSpPr>
+          <p:cNvPr id="4" name="TextBox 3">
+            <a:extLst>
+              <a:ext uri="{FF2B5EF4-FFF2-40B4-BE49-F238E27FC236}">
+                <a16:creationId xmlns:a16="http://schemas.microsoft.com/office/drawing/2014/main" id="{031BDDFF-D1AB-8A84-5BC2-94F55740BFA2}"/>
+              </a:ext>
+            </a:extLst>
+          </p:cNvPr>
+          <p:cNvSpPr txBox="1"/>
+          <p:nvPr/>
+        </p:nvSpPr>
+        <p:spPr>
+          <a:xfrm>
+            <a:off x="3768097" y="6164549"/>
+            <a:ext cx="548548" cy="369332"/>
+          </a:xfrm>
+          <a:prstGeom prst="rect">
+            <a:avLst/>
+          </a:prstGeom>
+          <a:solidFill>
+            <a:srgbClr val="FFFF00"/>
+          </a:solidFill>
+          <a:ln>
+            <a:solidFill>
+              <a:srgbClr val="FFFF00"/>
+            </a:solidFill>
+          </a:ln>
+        </p:spPr>
+        <p:txBody>
+          <a:bodyPr wrap="none" rtlCol="0">
+            <a:spAutoFit/>
+          </a:bodyPr>
+          <a:lstStyle/>
+          <a:p>
+            <a:r>
+              <a:rPr lang="en-US" dirty="0"/>
+              <a:t>+5V</a:t>
+            </a:r>
+          </a:p>
+        </p:txBody>
+      </p:sp>
+      <p:pic>
+        <p:nvPicPr>
+          <p:cNvPr id="17" name="Picture 16" descr="A green electrical device with metal pins&#10;&#10;Description automatically generated">
+            <a:extLst>
+              <a:ext uri="{FF2B5EF4-FFF2-40B4-BE49-F238E27FC236}">
+                <a16:creationId xmlns:a16="http://schemas.microsoft.com/office/drawing/2014/main" id="{8C387186-1A45-C838-08FE-E99D140FE5D9}"/>
+              </a:ext>
+            </a:extLst>
+          </p:cNvPr>
+          <p:cNvPicPr>
+            <a:picLocks noChangeAspect="1"/>
+          </p:cNvPicPr>
+          <p:nvPr/>
+        </p:nvPicPr>
+        <p:blipFill>
+          <a:blip r:embed="rId3"/>
+          <a:stretch>
+            <a:fillRect/>
+          </a:stretch>
+        </p:blipFill>
+        <p:spPr>
+          <a:xfrm rot="16200000">
+            <a:off x="2684096" y="4500050"/>
+            <a:ext cx="927364" cy="757942"/>
+          </a:xfrm>
+          <a:prstGeom prst="rect">
+            <a:avLst/>
+          </a:prstGeom>
+        </p:spPr>
+      </p:pic>
+      <p:cxnSp>
+        <p:nvCxnSpPr>
+          <p:cNvPr id="19" name="Elbow Connector 18">
+            <a:extLst>
+              <a:ext uri="{FF2B5EF4-FFF2-40B4-BE49-F238E27FC236}">
+                <a16:creationId xmlns:a16="http://schemas.microsoft.com/office/drawing/2014/main" id="{30009F14-5D54-10CB-29AB-3CDD46142042}"/>
+              </a:ext>
+            </a:extLst>
+          </p:cNvPr>
+          <p:cNvCxnSpPr/>
+          <p:nvPr/>
+        </p:nvCxnSpPr>
+        <p:spPr>
+          <a:xfrm rot="16200000" flipV="1">
+            <a:off x="3319797" y="5970273"/>
+            <a:ext cx="630195" cy="127688"/>
+          </a:xfrm>
+          <a:prstGeom prst="bentConnector3">
+            <a:avLst>
+              <a:gd name="adj1" fmla="val -981"/>
+            </a:avLst>
+          </a:prstGeom>
+          <a:ln w="44450" cap="flat" cmpd="sng" algn="ctr">
+            <a:solidFill>
+              <a:srgbClr val="FF0000"/>
+            </a:solidFill>
+            <a:prstDash val="solid"/>
+            <a:round/>
+            <a:headEnd type="oval" w="med" len="med"/>
+            <a:tailEnd type="oval" w="med" len="med"/>
+          </a:ln>
+        </p:spPr>
+        <p:style>
+          <a:lnRef idx="0">
+            <a:scrgbClr r="0" g="0" b="0"/>
+          </a:lnRef>
+          <a:fillRef idx="0">
+            <a:scrgbClr r="0" g="0" b="0"/>
+          </a:fillRef>
+          <a:effectRef idx="0">
+            <a:scrgbClr r="0" g="0" b="0"/>
+          </a:effectRef>
+          <a:fontRef idx="minor">
+            <a:schemeClr val="tx1"/>
+          </a:fontRef>
+        </p:style>
+      </p:cxnSp>
+      <p:cxnSp>
+        <p:nvCxnSpPr>
+          <p:cNvPr id="21" name="Elbow Connector 20">
+            <a:extLst>
+              <a:ext uri="{FF2B5EF4-FFF2-40B4-BE49-F238E27FC236}">
+                <a16:creationId xmlns:a16="http://schemas.microsoft.com/office/drawing/2014/main" id="{E17E5123-DF92-5167-A2D9-A252A2B36787}"/>
+              </a:ext>
+            </a:extLst>
+          </p:cNvPr>
+          <p:cNvCxnSpPr>
+            <a:cxnSpLocks/>
+          </p:cNvCxnSpPr>
+          <p:nvPr/>
+        </p:nvCxnSpPr>
+        <p:spPr>
+          <a:xfrm rot="16200000" flipV="1">
+            <a:off x="7943213" y="5879648"/>
+            <a:ext cx="504705" cy="144724"/>
+          </a:xfrm>
+          <a:prstGeom prst="bentConnector3">
+            <a:avLst>
+              <a:gd name="adj1" fmla="val 50000"/>
+            </a:avLst>
+          </a:prstGeom>
+          <a:ln w="44450" cap="flat" cmpd="sng" algn="ctr">
+            <a:solidFill>
+              <a:srgbClr val="00B0F0"/>
+            </a:solidFill>
+            <a:prstDash val="solid"/>
+            <a:round/>
+            <a:headEnd type="oval" w="med" len="med"/>
+            <a:tailEnd type="oval" w="med" len="med"/>
+          </a:ln>
+        </p:spPr>
+        <p:style>
+          <a:lnRef idx="0">
+            <a:scrgbClr r="0" g="0" b="0"/>
+          </a:lnRef>
+          <a:fillRef idx="0">
+            <a:scrgbClr r="0" g="0" b="0"/>
+          </a:fillRef>
+          <a:effectRef idx="0">
+            <a:scrgbClr r="0" g="0" b="0"/>
+          </a:effectRef>
+          <a:fontRef idx="minor">
+            <a:schemeClr val="tx1"/>
+          </a:fontRef>
+        </p:style>
+      </p:cxnSp>
+      <p:pic>
+        <p:nvPicPr>
+          <p:cNvPr id="41" name="Picture 40" descr="A green electrical device with metal pins&#10;&#10;Description automatically generated">
+            <a:extLst>
+              <a:ext uri="{FF2B5EF4-FFF2-40B4-BE49-F238E27FC236}">
+                <a16:creationId xmlns:a16="http://schemas.microsoft.com/office/drawing/2014/main" id="{0BFFB97F-91F8-C4D8-3A7B-45C8BF331586}"/>
+              </a:ext>
+            </a:extLst>
+          </p:cNvPr>
+          <p:cNvPicPr>
+            <a:picLocks noChangeAspect="1"/>
+          </p:cNvPicPr>
+          <p:nvPr/>
+        </p:nvPicPr>
+        <p:blipFill>
+          <a:blip r:embed="rId3"/>
+          <a:stretch>
+            <a:fillRect/>
+          </a:stretch>
+        </p:blipFill>
+        <p:spPr>
+          <a:xfrm rot="5400000">
+            <a:off x="8110854" y="4587130"/>
+            <a:ext cx="927364" cy="757942"/>
+          </a:xfrm>
+          <a:prstGeom prst="rect">
+            <a:avLst/>
+          </a:prstGeom>
+        </p:spPr>
+      </p:pic>
+      <p:cxnSp>
+        <p:nvCxnSpPr>
+          <p:cNvPr id="42" name="Elbow Connector 41">
+            <a:extLst>
+              <a:ext uri="{FF2B5EF4-FFF2-40B4-BE49-F238E27FC236}">
+                <a16:creationId xmlns:a16="http://schemas.microsoft.com/office/drawing/2014/main" id="{74E9266B-F4F8-A5BB-0762-6BBFCD302003}"/>
+              </a:ext>
+            </a:extLst>
+          </p:cNvPr>
+          <p:cNvCxnSpPr>
+            <a:cxnSpLocks/>
+          </p:cNvCxnSpPr>
+          <p:nvPr/>
+        </p:nvCxnSpPr>
+        <p:spPr>
+          <a:xfrm flipV="1">
+            <a:off x="6714025" y="3162368"/>
+            <a:ext cx="1147588" cy="551241"/>
+          </a:xfrm>
+          <a:prstGeom prst="bentConnector3">
+            <a:avLst>
+              <a:gd name="adj1" fmla="val 50000"/>
+            </a:avLst>
+          </a:prstGeom>
+          <a:ln w="44450" cap="flat" cmpd="sng" algn="ctr">
+            <a:solidFill>
+              <a:srgbClr val="73FB79"/>
+            </a:solidFill>
+            <a:prstDash val="solid"/>
+            <a:round/>
+            <a:headEnd type="oval" w="med" len="med"/>
+            <a:tailEnd type="oval" w="med" len="med"/>
+          </a:ln>
+        </p:spPr>
+        <p:style>
+          <a:lnRef idx="0">
+            <a:scrgbClr r="0" g="0" b="0"/>
+          </a:lnRef>
+          <a:fillRef idx="0">
+            <a:scrgbClr r="0" g="0" b="0"/>
+          </a:fillRef>
+          <a:effectRef idx="0">
+            <a:scrgbClr r="0" g="0" b="0"/>
+          </a:effectRef>
+          <a:fontRef idx="minor">
+            <a:schemeClr val="tx1"/>
+          </a:fontRef>
+        </p:style>
+      </p:cxnSp>
+      <p:cxnSp>
+        <p:nvCxnSpPr>
+          <p:cNvPr id="43" name="Elbow Connector 42">
+            <a:extLst>
+              <a:ext uri="{FF2B5EF4-FFF2-40B4-BE49-F238E27FC236}">
+                <a16:creationId xmlns:a16="http://schemas.microsoft.com/office/drawing/2014/main" id="{ECDBD89E-AB58-E49A-159F-DDF0CB4FEDB6}"/>
+              </a:ext>
+            </a:extLst>
+          </p:cNvPr>
+          <p:cNvCxnSpPr>
+            <a:cxnSpLocks/>
+          </p:cNvCxnSpPr>
+          <p:nvPr/>
+        </p:nvCxnSpPr>
+        <p:spPr>
+          <a:xfrm rot="10800000" flipV="1">
+            <a:off x="7296091" y="6555475"/>
+            <a:ext cx="3545180" cy="65694"/>
+          </a:xfrm>
+          <a:prstGeom prst="bentConnector3">
+            <a:avLst>
+              <a:gd name="adj1" fmla="val 36688"/>
+            </a:avLst>
+          </a:prstGeom>
+          <a:ln w="44450" cap="flat" cmpd="sng" algn="ctr">
+            <a:solidFill>
+              <a:srgbClr val="00B0F0"/>
+            </a:solidFill>
+            <a:prstDash val="solid"/>
+            <a:round/>
+            <a:headEnd type="oval" w="med" len="med"/>
+            <a:tailEnd type="oval" w="med" len="med"/>
+          </a:ln>
+        </p:spPr>
+        <p:style>
+          <a:lnRef idx="0">
+            <a:scrgbClr r="0" g="0" b="0"/>
+          </a:lnRef>
+          <a:fillRef idx="0">
+            <a:scrgbClr r="0" g="0" b="0"/>
+          </a:fillRef>
+          <a:effectRef idx="0">
+            <a:scrgbClr r="0" g="0" b="0"/>
+          </a:effectRef>
+          <a:fontRef idx="minor">
+            <a:schemeClr val="tx1"/>
+          </a:fontRef>
+        </p:style>
+      </p:cxnSp>
+      <p:sp>
+        <p:nvSpPr>
+          <p:cNvPr id="47" name="TextBox 46">
+            <a:extLst>
+              <a:ext uri="{FF2B5EF4-FFF2-40B4-BE49-F238E27FC236}">
+                <a16:creationId xmlns:a16="http://schemas.microsoft.com/office/drawing/2014/main" id="{2452AE63-A912-F8B7-F408-6EFB9B07D6AE}"/>
+              </a:ext>
+            </a:extLst>
+          </p:cNvPr>
+          <p:cNvSpPr txBox="1"/>
+          <p:nvPr/>
+        </p:nvSpPr>
+        <p:spPr>
+          <a:xfrm>
+            <a:off x="4818049" y="153690"/>
+            <a:ext cx="2172069" cy="707886"/>
+          </a:xfrm>
+          <a:prstGeom prst="rect">
+            <a:avLst/>
+          </a:prstGeom>
+          <a:noFill/>
+        </p:spPr>
+        <p:txBody>
+          <a:bodyPr wrap="none" rtlCol="0">
+            <a:spAutoFit/>
+          </a:bodyPr>
+          <a:lstStyle/>
+          <a:p>
+            <a:r>
+              <a:rPr lang="en-US" sz="2000" dirty="0"/>
+              <a:t>Basic I/O Board I2C</a:t>
+            </a:r>
+          </a:p>
+          <a:p>
+            <a:r>
+              <a:rPr lang="en-US" sz="2000" dirty="0"/>
+              <a:t>Temp, Flow, ADC</a:t>
+            </a:r>
+          </a:p>
+        </p:txBody>
+      </p:sp>
+      <p:sp>
+        <p:nvSpPr>
+          <p:cNvPr id="49" name="TextBox 48">
+            <a:extLst>
+              <a:ext uri="{FF2B5EF4-FFF2-40B4-BE49-F238E27FC236}">
+                <a16:creationId xmlns:a16="http://schemas.microsoft.com/office/drawing/2014/main" id="{E895220C-2487-D84A-D45A-6119B61A64E6}"/>
+              </a:ext>
+            </a:extLst>
+          </p:cNvPr>
+          <p:cNvSpPr txBox="1"/>
+          <p:nvPr/>
+        </p:nvSpPr>
+        <p:spPr>
+          <a:xfrm rot="16200000">
+            <a:off x="6290345" y="393774"/>
+            <a:ext cx="1736373" cy="2354491"/>
+          </a:xfrm>
+          <a:prstGeom prst="rect">
+            <a:avLst/>
+          </a:prstGeom>
+          <a:noFill/>
+        </p:spPr>
+        <p:txBody>
+          <a:bodyPr wrap="none" rtlCol="0">
+            <a:spAutoFit/>
+          </a:bodyPr>
+          <a:lstStyle/>
+          <a:p>
+            <a:pPr>
+              <a:spcBef>
+                <a:spcPts val="600"/>
+              </a:spcBef>
+            </a:pPr>
+            <a:r>
+              <a:rPr lang="en-US" sz="1400" dirty="0"/>
+              <a:t>03 – Config #2</a:t>
+            </a:r>
+          </a:p>
+          <a:p>
+            <a:pPr>
+              <a:spcBef>
+                <a:spcPts val="600"/>
+              </a:spcBef>
+            </a:pPr>
+            <a:r>
+              <a:rPr lang="en-US" sz="1400" dirty="0"/>
+              <a:t>01 – Unused</a:t>
+            </a:r>
+          </a:p>
+          <a:p>
+            <a:pPr>
+              <a:spcBef>
+                <a:spcPts val="600"/>
+              </a:spcBef>
+            </a:pPr>
+            <a:r>
+              <a:rPr lang="en-US" sz="1400" dirty="0"/>
+              <a:t>16 – Disc #3 (no PUP)</a:t>
+            </a:r>
+          </a:p>
+          <a:p>
+            <a:pPr>
+              <a:spcBef>
+                <a:spcPts val="600"/>
+              </a:spcBef>
+            </a:pPr>
+            <a:r>
+              <a:rPr lang="en-US" sz="1400" dirty="0"/>
+              <a:t>05 – Disc #2</a:t>
+            </a:r>
+          </a:p>
+          <a:p>
+            <a:pPr>
+              <a:spcBef>
+                <a:spcPts val="600"/>
+              </a:spcBef>
+            </a:pPr>
+            <a:r>
+              <a:rPr lang="en-US" sz="1400" dirty="0"/>
+              <a:t>04 – Config #3</a:t>
+            </a:r>
+          </a:p>
+          <a:p>
+            <a:pPr>
+              <a:spcBef>
+                <a:spcPts val="600"/>
+              </a:spcBef>
+            </a:pPr>
+            <a:r>
+              <a:rPr lang="en-US" sz="1400" dirty="0"/>
+              <a:t>14 – Disc #1</a:t>
+            </a:r>
+          </a:p>
+          <a:p>
+            <a:pPr>
+              <a:spcBef>
+                <a:spcPts val="600"/>
+              </a:spcBef>
+            </a:pPr>
+            <a:r>
+              <a:rPr lang="en-US" sz="1400" dirty="0"/>
+              <a:t>12 – Config #1</a:t>
+            </a:r>
+          </a:p>
+          <a:p>
+            <a:pPr>
+              <a:spcBef>
+                <a:spcPts val="600"/>
+              </a:spcBef>
+            </a:pPr>
+            <a:r>
+              <a:rPr lang="en-US" sz="1400" dirty="0"/>
+              <a:t>13 – Flow Sensor</a:t>
+            </a:r>
+          </a:p>
+        </p:txBody>
+      </p:sp>
+      <p:sp>
+        <p:nvSpPr>
+          <p:cNvPr id="2" name="TextBox 1">
+            <a:extLst>
+              <a:ext uri="{FF2B5EF4-FFF2-40B4-BE49-F238E27FC236}">
+                <a16:creationId xmlns:a16="http://schemas.microsoft.com/office/drawing/2014/main" id="{F17F6E50-7C9F-E638-4A34-3EC82A565C42}"/>
+              </a:ext>
+            </a:extLst>
+          </p:cNvPr>
+          <p:cNvSpPr txBox="1"/>
+          <p:nvPr/>
+        </p:nvSpPr>
+        <p:spPr>
+          <a:xfrm>
+            <a:off x="8324231" y="5766254"/>
+            <a:ext cx="574196" cy="369332"/>
+          </a:xfrm>
+          <a:prstGeom prst="rect">
+            <a:avLst/>
+          </a:prstGeom>
+          <a:solidFill>
+            <a:srgbClr val="FFFF00"/>
+          </a:solidFill>
+          <a:ln>
+            <a:solidFill>
+              <a:srgbClr val="FFFF00"/>
+            </a:solidFill>
+          </a:ln>
+        </p:spPr>
+        <p:txBody>
+          <a:bodyPr wrap="none" rtlCol="0">
+            <a:spAutoFit/>
+          </a:bodyPr>
+          <a:lstStyle/>
+          <a:p>
+            <a:r>
+              <a:rPr lang="en-US" dirty="0" err="1"/>
+              <a:t>Gnd</a:t>
+            </a:r>
+            <a:endParaRPr lang="en-US" dirty="0"/>
+          </a:p>
+        </p:txBody>
+      </p:sp>
+      <p:sp>
+        <p:nvSpPr>
+          <p:cNvPr id="8" name="TextBox 7">
+            <a:extLst>
+              <a:ext uri="{FF2B5EF4-FFF2-40B4-BE49-F238E27FC236}">
+                <a16:creationId xmlns:a16="http://schemas.microsoft.com/office/drawing/2014/main" id="{B78C79A3-07AD-0F4F-D16F-47F7D20C6DDE}"/>
+              </a:ext>
+            </a:extLst>
+          </p:cNvPr>
+          <p:cNvSpPr txBox="1"/>
+          <p:nvPr/>
+        </p:nvSpPr>
+        <p:spPr>
+          <a:xfrm rot="16200000">
+            <a:off x="3628347" y="281276"/>
+            <a:ext cx="1376595" cy="2939266"/>
+          </a:xfrm>
+          <a:prstGeom prst="rect">
+            <a:avLst/>
+          </a:prstGeom>
+          <a:noFill/>
+        </p:spPr>
+        <p:txBody>
+          <a:bodyPr wrap="none" rtlCol="0">
+            <a:spAutoFit/>
+          </a:bodyPr>
+          <a:lstStyle/>
+          <a:p>
+            <a:pPr>
+              <a:spcBef>
+                <a:spcPts val="600"/>
+              </a:spcBef>
+            </a:pPr>
+            <a:r>
+              <a:rPr lang="en-US" sz="1400" dirty="0"/>
+              <a:t>15 – Unused</a:t>
+            </a:r>
+          </a:p>
+          <a:p>
+            <a:pPr>
+              <a:spcBef>
+                <a:spcPts val="600"/>
+              </a:spcBef>
+            </a:pPr>
+            <a:r>
+              <a:rPr lang="en-US" sz="1400" dirty="0"/>
+              <a:t>14 – Disc #1</a:t>
+            </a:r>
+          </a:p>
+          <a:p>
+            <a:pPr>
+              <a:spcBef>
+                <a:spcPts val="600"/>
+              </a:spcBef>
+            </a:pPr>
+            <a:r>
+              <a:rPr lang="en-US" sz="1400" dirty="0"/>
+              <a:t>N/C</a:t>
+            </a:r>
+          </a:p>
+          <a:p>
+            <a:pPr>
+              <a:spcBef>
+                <a:spcPts val="600"/>
+              </a:spcBef>
+            </a:pPr>
+            <a:r>
+              <a:rPr lang="en-US" sz="1400" dirty="0"/>
+              <a:t>GND</a:t>
+            </a:r>
+          </a:p>
+          <a:p>
+            <a:pPr>
+              <a:spcBef>
+                <a:spcPts val="600"/>
+              </a:spcBef>
+            </a:pPr>
+            <a:r>
+              <a:rPr lang="en-US" sz="1400" dirty="0"/>
+              <a:t>14 – Disc #1</a:t>
+            </a:r>
+          </a:p>
+          <a:p>
+            <a:pPr>
+              <a:spcBef>
+                <a:spcPts val="600"/>
+              </a:spcBef>
+            </a:pPr>
+            <a:r>
+              <a:rPr lang="en-US" sz="1400" dirty="0"/>
+              <a:t>12 – Config #1</a:t>
+            </a:r>
+          </a:p>
+          <a:p>
+            <a:pPr>
+              <a:spcBef>
+                <a:spcPts val="600"/>
+              </a:spcBef>
+            </a:pPr>
+            <a:r>
+              <a:rPr lang="en-US" sz="1400" dirty="0"/>
+              <a:t>13 – </a:t>
+            </a:r>
+            <a:r>
+              <a:rPr lang="en-US" sz="1400" dirty="0" err="1"/>
+              <a:t>FlowSensor</a:t>
+            </a:r>
+            <a:endParaRPr lang="en-US" sz="1400" dirty="0"/>
+          </a:p>
+          <a:p>
+            <a:pPr>
+              <a:spcBef>
+                <a:spcPts val="600"/>
+              </a:spcBef>
+            </a:pPr>
+            <a:r>
+              <a:rPr lang="en-US" sz="1400" dirty="0"/>
+              <a:t>15 - Unused</a:t>
+            </a:r>
+          </a:p>
+          <a:p>
+            <a:pPr>
+              <a:spcBef>
+                <a:spcPts val="600"/>
+              </a:spcBef>
+            </a:pPr>
+            <a:r>
+              <a:rPr lang="en-US" sz="1400" dirty="0"/>
+              <a:t>02 - </a:t>
+            </a:r>
+            <a:r>
+              <a:rPr lang="en-US" sz="1400" dirty="0" err="1"/>
+              <a:t>TempSens</a:t>
+            </a:r>
+            <a:endParaRPr lang="en-US" sz="1400" dirty="0"/>
+          </a:p>
+          <a:p>
+            <a:pPr>
+              <a:spcBef>
+                <a:spcPts val="600"/>
+              </a:spcBef>
+            </a:pPr>
+            <a:r>
+              <a:rPr lang="en-US" sz="1400" dirty="0"/>
+              <a:t>00 - Unused</a:t>
+            </a:r>
+          </a:p>
+        </p:txBody>
+      </p:sp>
+      <p:cxnSp>
+        <p:nvCxnSpPr>
+          <p:cNvPr id="20" name="Elbow Connector 19">
+            <a:extLst>
+              <a:ext uri="{FF2B5EF4-FFF2-40B4-BE49-F238E27FC236}">
+                <a16:creationId xmlns:a16="http://schemas.microsoft.com/office/drawing/2014/main" id="{391E2CE3-8201-32BD-F8F1-C6ACF713BB7B}"/>
+              </a:ext>
+            </a:extLst>
+          </p:cNvPr>
+          <p:cNvCxnSpPr>
+            <a:cxnSpLocks/>
+          </p:cNvCxnSpPr>
+          <p:nvPr/>
+        </p:nvCxnSpPr>
+        <p:spPr>
+          <a:xfrm flipV="1">
+            <a:off x="6147257" y="3162367"/>
+            <a:ext cx="1148833" cy="551242"/>
+          </a:xfrm>
+          <a:prstGeom prst="bentConnector3">
+            <a:avLst>
+              <a:gd name="adj1" fmla="val 50000"/>
+            </a:avLst>
+          </a:prstGeom>
+          <a:ln w="44450" cap="flat" cmpd="sng" algn="ctr">
+            <a:solidFill>
+              <a:srgbClr val="73FB79"/>
+            </a:solidFill>
+            <a:prstDash val="solid"/>
+            <a:round/>
+            <a:headEnd type="oval" w="med" len="med"/>
+            <a:tailEnd type="oval" w="med" len="med"/>
+          </a:ln>
+        </p:spPr>
+        <p:style>
+          <a:lnRef idx="0">
+            <a:scrgbClr r="0" g="0" b="0"/>
+          </a:lnRef>
+          <a:fillRef idx="0">
+            <a:scrgbClr r="0" g="0" b="0"/>
+          </a:fillRef>
+          <a:effectRef idx="0">
+            <a:scrgbClr r="0" g="0" b="0"/>
+          </a:effectRef>
+          <a:fontRef idx="minor">
+            <a:schemeClr val="tx1"/>
+          </a:fontRef>
+        </p:style>
+      </p:cxnSp>
+      <p:cxnSp>
+        <p:nvCxnSpPr>
+          <p:cNvPr id="26" name="Elbow Connector 25">
+            <a:extLst>
+              <a:ext uri="{FF2B5EF4-FFF2-40B4-BE49-F238E27FC236}">
+                <a16:creationId xmlns:a16="http://schemas.microsoft.com/office/drawing/2014/main" id="{6C8A303C-F5B5-D784-C24E-175ECF14DE37}"/>
+              </a:ext>
+            </a:extLst>
+          </p:cNvPr>
+          <p:cNvCxnSpPr>
+            <a:cxnSpLocks/>
+          </p:cNvCxnSpPr>
+          <p:nvPr/>
+        </p:nvCxnSpPr>
+        <p:spPr>
+          <a:xfrm rot="16200000" flipV="1">
+            <a:off x="6017555" y="3292073"/>
+            <a:ext cx="551238" cy="291834"/>
+          </a:xfrm>
+          <a:prstGeom prst="bentConnector3">
+            <a:avLst>
+              <a:gd name="adj1" fmla="val 50000"/>
+            </a:avLst>
+          </a:prstGeom>
+          <a:ln w="44450" cap="flat" cmpd="sng" algn="ctr">
+            <a:solidFill>
+              <a:srgbClr val="73FB79"/>
+            </a:solidFill>
+            <a:prstDash val="solid"/>
+            <a:round/>
+            <a:headEnd type="oval" w="med" len="med"/>
+            <a:tailEnd type="oval" w="med" len="med"/>
+          </a:ln>
+        </p:spPr>
+        <p:style>
+          <a:lnRef idx="0">
+            <a:scrgbClr r="0" g="0" b="0"/>
+          </a:lnRef>
+          <a:fillRef idx="0">
+            <a:scrgbClr r="0" g="0" b="0"/>
+          </a:fillRef>
+          <a:effectRef idx="0">
+            <a:scrgbClr r="0" g="0" b="0"/>
+          </a:effectRef>
+          <a:fontRef idx="minor">
+            <a:schemeClr val="tx1"/>
+          </a:fontRef>
+        </p:style>
+      </p:cxnSp>
+      <p:pic>
+        <p:nvPicPr>
+          <p:cNvPr id="51" name="Picture 50" descr="A green electrical device with metal pins&#10;&#10;Description automatically generated">
+            <a:extLst>
+              <a:ext uri="{FF2B5EF4-FFF2-40B4-BE49-F238E27FC236}">
+                <a16:creationId xmlns:a16="http://schemas.microsoft.com/office/drawing/2014/main" id="{044A0057-6E1A-041A-445A-88593EC75055}"/>
+              </a:ext>
+            </a:extLst>
+          </p:cNvPr>
+          <p:cNvPicPr>
+            <a:picLocks noChangeAspect="1"/>
+          </p:cNvPicPr>
+          <p:nvPr/>
+        </p:nvPicPr>
+        <p:blipFill>
+          <a:blip r:embed="rId3"/>
+          <a:stretch>
+            <a:fillRect/>
+          </a:stretch>
+        </p:blipFill>
+        <p:spPr>
+          <a:xfrm rot="10800000" flipV="1">
+            <a:off x="6745706" y="5698305"/>
+            <a:ext cx="927364" cy="757942"/>
+          </a:xfrm>
+          <a:prstGeom prst="rect">
+            <a:avLst/>
+          </a:prstGeom>
+        </p:spPr>
+      </p:pic>
+      <p:cxnSp>
+        <p:nvCxnSpPr>
+          <p:cNvPr id="55" name="Elbow Connector 54">
+            <a:extLst>
+              <a:ext uri="{FF2B5EF4-FFF2-40B4-BE49-F238E27FC236}">
+                <a16:creationId xmlns:a16="http://schemas.microsoft.com/office/drawing/2014/main" id="{F068D0BE-7AC8-D004-FBE8-07C3A932CE73}"/>
+              </a:ext>
+            </a:extLst>
+          </p:cNvPr>
+          <p:cNvCxnSpPr>
+            <a:cxnSpLocks/>
+          </p:cNvCxnSpPr>
+          <p:nvPr/>
+        </p:nvCxnSpPr>
+        <p:spPr>
+          <a:xfrm rot="10800000" flipV="1">
+            <a:off x="7482349" y="6319752"/>
+            <a:ext cx="3358923" cy="161464"/>
+          </a:xfrm>
+          <a:prstGeom prst="bentConnector3">
+            <a:avLst>
+              <a:gd name="adj1" fmla="val 50000"/>
+            </a:avLst>
+          </a:prstGeom>
+          <a:ln w="44450" cap="flat" cmpd="sng" algn="ctr">
+            <a:solidFill>
+              <a:srgbClr val="00B0F0"/>
+            </a:solidFill>
+            <a:prstDash val="solid"/>
+            <a:round/>
+            <a:headEnd type="oval" w="med" len="med"/>
+            <a:tailEnd type="oval" w="med" len="med"/>
+          </a:ln>
+        </p:spPr>
+        <p:style>
+          <a:lnRef idx="0">
+            <a:scrgbClr r="0" g="0" b="0"/>
+          </a:lnRef>
+          <a:fillRef idx="0">
+            <a:scrgbClr r="0" g="0" b="0"/>
+          </a:fillRef>
+          <a:effectRef idx="0">
+            <a:scrgbClr r="0" g="0" b="0"/>
+          </a:effectRef>
+          <a:fontRef idx="minor">
+            <a:schemeClr val="tx1"/>
+          </a:fontRef>
+        </p:style>
+      </p:cxnSp>
+      <p:cxnSp>
+        <p:nvCxnSpPr>
+          <p:cNvPr id="56" name="Elbow Connector 55">
+            <a:extLst>
+              <a:ext uri="{FF2B5EF4-FFF2-40B4-BE49-F238E27FC236}">
+                <a16:creationId xmlns:a16="http://schemas.microsoft.com/office/drawing/2014/main" id="{C4D94999-02A7-C8C5-4A7E-749619AA9CB9}"/>
+              </a:ext>
+            </a:extLst>
+          </p:cNvPr>
+          <p:cNvCxnSpPr>
+            <a:cxnSpLocks/>
+          </p:cNvCxnSpPr>
+          <p:nvPr/>
+        </p:nvCxnSpPr>
+        <p:spPr>
+          <a:xfrm rot="10800000" flipV="1">
+            <a:off x="7711087" y="6043430"/>
+            <a:ext cx="3133864" cy="267715"/>
+          </a:xfrm>
+          <a:prstGeom prst="bentConnector3">
+            <a:avLst>
+              <a:gd name="adj1" fmla="val 50000"/>
+            </a:avLst>
+          </a:prstGeom>
+          <a:ln w="44450" cap="flat" cmpd="sng" algn="ctr">
+            <a:solidFill>
+              <a:srgbClr val="00B0F0"/>
+            </a:solidFill>
+            <a:prstDash val="solid"/>
+            <a:round/>
+            <a:headEnd type="oval" w="med" len="med"/>
+            <a:tailEnd type="oval" w="med" len="med"/>
+          </a:ln>
+        </p:spPr>
+        <p:style>
+          <a:lnRef idx="0">
+            <a:scrgbClr r="0" g="0" b="0"/>
+          </a:lnRef>
+          <a:fillRef idx="0">
+            <a:scrgbClr r="0" g="0" b="0"/>
+          </a:fillRef>
+          <a:effectRef idx="0">
+            <a:scrgbClr r="0" g="0" b="0"/>
+          </a:effectRef>
+          <a:fontRef idx="minor">
+            <a:schemeClr val="tx1"/>
+          </a:fontRef>
+        </p:style>
+      </p:cxnSp>
+      <p:sp>
+        <p:nvSpPr>
+          <p:cNvPr id="57" name="TextBox 56">
+            <a:extLst>
+              <a:ext uri="{FF2B5EF4-FFF2-40B4-BE49-F238E27FC236}">
+                <a16:creationId xmlns:a16="http://schemas.microsoft.com/office/drawing/2014/main" id="{98ED689D-7D76-ECA3-2ACD-D876DC342765}"/>
+              </a:ext>
+            </a:extLst>
+          </p:cNvPr>
+          <p:cNvSpPr txBox="1"/>
+          <p:nvPr/>
+        </p:nvSpPr>
+        <p:spPr>
+          <a:xfrm>
+            <a:off x="10901254" y="5913175"/>
+            <a:ext cx="1150535" cy="738664"/>
+          </a:xfrm>
+          <a:prstGeom prst="rect">
+            <a:avLst/>
+          </a:prstGeom>
+          <a:noFill/>
+        </p:spPr>
+        <p:txBody>
+          <a:bodyPr wrap="square" rtlCol="0">
+            <a:spAutoFit/>
+          </a:bodyPr>
+          <a:lstStyle/>
+          <a:p>
+            <a:r>
+              <a:rPr lang="en-US" sz="1400" dirty="0"/>
+              <a:t>Temp Sensor</a:t>
+            </a:r>
+          </a:p>
+          <a:p>
+            <a:r>
+              <a:rPr lang="en-US" sz="1400" dirty="0"/>
+              <a:t>Flow Sensor</a:t>
+            </a:r>
+          </a:p>
+          <a:p>
+            <a:r>
+              <a:rPr lang="en-US" sz="1400" dirty="0"/>
+              <a:t>Analog +v</a:t>
+            </a:r>
+          </a:p>
+        </p:txBody>
+      </p:sp>
+      <p:cxnSp>
+        <p:nvCxnSpPr>
+          <p:cNvPr id="60" name="Elbow Connector 59">
+            <a:extLst>
+              <a:ext uri="{FF2B5EF4-FFF2-40B4-BE49-F238E27FC236}">
+                <a16:creationId xmlns:a16="http://schemas.microsoft.com/office/drawing/2014/main" id="{0460027C-CCAE-4889-7748-E26AE247EF92}"/>
+              </a:ext>
+            </a:extLst>
+          </p:cNvPr>
+          <p:cNvCxnSpPr>
+            <a:cxnSpLocks/>
+          </p:cNvCxnSpPr>
+          <p:nvPr/>
+        </p:nvCxnSpPr>
+        <p:spPr>
+          <a:xfrm rot="5400000" flipH="1" flipV="1">
+            <a:off x="6855638" y="3561283"/>
+            <a:ext cx="1674935" cy="877106"/>
+          </a:xfrm>
+          <a:prstGeom prst="bentConnector3">
+            <a:avLst>
+              <a:gd name="adj1" fmla="val 50000"/>
+            </a:avLst>
+          </a:prstGeom>
+          <a:ln w="44450" cap="flat" cmpd="sng" algn="ctr">
+            <a:solidFill>
+              <a:srgbClr val="FFFF00"/>
+            </a:solidFill>
+            <a:prstDash val="solid"/>
+            <a:round/>
+            <a:headEnd type="oval" w="med" len="med"/>
+            <a:tailEnd type="oval" w="med" len="med"/>
+          </a:ln>
+        </p:spPr>
+        <p:style>
+          <a:lnRef idx="0">
+            <a:scrgbClr r="0" g="0" b="0"/>
+          </a:lnRef>
+          <a:fillRef idx="0">
+            <a:scrgbClr r="0" g="0" b="0"/>
+          </a:fillRef>
+          <a:effectRef idx="0">
+            <a:scrgbClr r="0" g="0" b="0"/>
+          </a:effectRef>
+          <a:fontRef idx="minor">
+            <a:schemeClr val="tx1"/>
+          </a:fontRef>
+        </p:style>
+      </p:cxnSp>
+      <p:cxnSp>
+        <p:nvCxnSpPr>
+          <p:cNvPr id="1024" name="Elbow Connector 1023">
+            <a:extLst>
+              <a:ext uri="{FF2B5EF4-FFF2-40B4-BE49-F238E27FC236}">
+                <a16:creationId xmlns:a16="http://schemas.microsoft.com/office/drawing/2014/main" id="{0E920A1A-411F-C868-21F6-1B1280FE4BF3}"/>
+              </a:ext>
+            </a:extLst>
+          </p:cNvPr>
+          <p:cNvCxnSpPr>
+            <a:cxnSpLocks/>
+          </p:cNvCxnSpPr>
+          <p:nvPr/>
+        </p:nvCxnSpPr>
+        <p:spPr>
+          <a:xfrm rot="10800000">
+            <a:off x="5344205" y="3162368"/>
+            <a:ext cx="2208907" cy="1716308"/>
+          </a:xfrm>
+          <a:prstGeom prst="bentConnector3">
+            <a:avLst>
+              <a:gd name="adj1" fmla="val 78488"/>
+            </a:avLst>
+          </a:prstGeom>
+          <a:ln w="44450" cap="flat" cmpd="sng" algn="ctr">
+            <a:solidFill>
+              <a:srgbClr val="FFFF00"/>
+            </a:solidFill>
+            <a:prstDash val="solid"/>
+            <a:round/>
+            <a:headEnd type="oval" w="med" len="med"/>
+            <a:tailEnd type="oval" w="med" len="med"/>
+          </a:ln>
+        </p:spPr>
+        <p:style>
+          <a:lnRef idx="0">
+            <a:scrgbClr r="0" g="0" b="0"/>
+          </a:lnRef>
+          <a:fillRef idx="0">
+            <a:scrgbClr r="0" g="0" b="0"/>
+          </a:fillRef>
+          <a:effectRef idx="0">
+            <a:scrgbClr r="0" g="0" b="0"/>
+          </a:effectRef>
+          <a:fontRef idx="minor">
+            <a:schemeClr val="tx1"/>
+          </a:fontRef>
+        </p:style>
+      </p:cxnSp>
+      <p:sp>
+        <p:nvSpPr>
+          <p:cNvPr id="1032" name="TextBox 1031">
+            <a:extLst>
+              <a:ext uri="{FF2B5EF4-FFF2-40B4-BE49-F238E27FC236}">
+                <a16:creationId xmlns:a16="http://schemas.microsoft.com/office/drawing/2014/main" id="{22191611-B9B1-D68A-BCD5-6E38778FF83D}"/>
+              </a:ext>
+            </a:extLst>
+          </p:cNvPr>
+          <p:cNvSpPr txBox="1"/>
+          <p:nvPr/>
+        </p:nvSpPr>
+        <p:spPr>
+          <a:xfrm>
+            <a:off x="3722662" y="4843779"/>
+            <a:ext cx="587020" cy="307777"/>
+          </a:xfrm>
+          <a:prstGeom prst="rect">
+            <a:avLst/>
+          </a:prstGeom>
+          <a:solidFill>
+            <a:schemeClr val="accent1">
+              <a:lumMod val="20000"/>
+              <a:lumOff val="80000"/>
+            </a:schemeClr>
+          </a:solidFill>
+        </p:spPr>
+        <p:txBody>
+          <a:bodyPr wrap="none" rtlCol="0">
+            <a:spAutoFit/>
+          </a:bodyPr>
+          <a:lstStyle/>
+          <a:p>
+            <a:r>
+              <a:rPr lang="en-US" sz="1400" dirty="0"/>
+              <a:t>R1 1k</a:t>
+            </a:r>
+          </a:p>
+        </p:txBody>
+      </p:sp>
+      <p:sp>
+        <p:nvSpPr>
+          <p:cNvPr id="1033" name="TextBox 1032">
+            <a:extLst>
+              <a:ext uri="{FF2B5EF4-FFF2-40B4-BE49-F238E27FC236}">
+                <a16:creationId xmlns:a16="http://schemas.microsoft.com/office/drawing/2014/main" id="{EFFC0D20-ACB4-AE12-DB8B-D0D4900DC9E9}"/>
+              </a:ext>
+            </a:extLst>
+          </p:cNvPr>
+          <p:cNvSpPr txBox="1"/>
+          <p:nvPr/>
+        </p:nvSpPr>
+        <p:spPr>
+          <a:xfrm>
+            <a:off x="4683603" y="5048122"/>
+            <a:ext cx="734496" cy="307777"/>
+          </a:xfrm>
+          <a:prstGeom prst="rect">
+            <a:avLst/>
+          </a:prstGeom>
+          <a:solidFill>
+            <a:schemeClr val="accent1">
+              <a:lumMod val="20000"/>
+              <a:lumOff val="80000"/>
+            </a:schemeClr>
+          </a:solidFill>
+        </p:spPr>
+        <p:txBody>
+          <a:bodyPr wrap="none" rtlCol="0">
+            <a:spAutoFit/>
+          </a:bodyPr>
+          <a:lstStyle/>
+          <a:p>
+            <a:r>
+              <a:rPr lang="en-US" sz="1400" dirty="0"/>
+              <a:t>R2 2.2K</a:t>
+            </a:r>
+          </a:p>
+        </p:txBody>
+      </p:sp>
+      <p:cxnSp>
+        <p:nvCxnSpPr>
+          <p:cNvPr id="1034" name="Elbow Connector 1033">
+            <a:extLst>
+              <a:ext uri="{FF2B5EF4-FFF2-40B4-BE49-F238E27FC236}">
+                <a16:creationId xmlns:a16="http://schemas.microsoft.com/office/drawing/2014/main" id="{F35D41F0-1EE6-94B2-D4D2-379DBD2FA967}"/>
+              </a:ext>
+            </a:extLst>
+          </p:cNvPr>
+          <p:cNvCxnSpPr>
+            <a:cxnSpLocks/>
+          </p:cNvCxnSpPr>
+          <p:nvPr/>
+        </p:nvCxnSpPr>
+        <p:spPr>
+          <a:xfrm>
+            <a:off x="5551219" y="5139631"/>
+            <a:ext cx="2570441" cy="302570"/>
+          </a:xfrm>
+          <a:prstGeom prst="bentConnector3">
+            <a:avLst>
+              <a:gd name="adj1" fmla="val 61475"/>
+            </a:avLst>
+          </a:prstGeom>
+          <a:ln w="44450" cap="flat" cmpd="sng" algn="ctr">
+            <a:solidFill>
+              <a:srgbClr val="00B0F0"/>
+            </a:solidFill>
+            <a:prstDash val="solid"/>
+            <a:round/>
+            <a:headEnd type="oval" w="med" len="med"/>
+            <a:tailEnd type="oval" w="med" len="med"/>
+          </a:ln>
+        </p:spPr>
+        <p:style>
+          <a:lnRef idx="0">
+            <a:scrgbClr r="0" g="0" b="0"/>
+          </a:lnRef>
+          <a:fillRef idx="0">
+            <a:scrgbClr r="0" g="0" b="0"/>
+          </a:fillRef>
+          <a:effectRef idx="0">
+            <a:scrgbClr r="0" g="0" b="0"/>
+          </a:effectRef>
+          <a:fontRef idx="minor">
+            <a:schemeClr val="tx1"/>
+          </a:fontRef>
+        </p:style>
+      </p:cxnSp>
+      <p:cxnSp>
+        <p:nvCxnSpPr>
+          <p:cNvPr id="1040" name="Elbow Connector 1039">
+            <a:extLst>
+              <a:ext uri="{FF2B5EF4-FFF2-40B4-BE49-F238E27FC236}">
+                <a16:creationId xmlns:a16="http://schemas.microsoft.com/office/drawing/2014/main" id="{89F260CF-501D-66C5-278B-734E23653EC0}"/>
+              </a:ext>
+            </a:extLst>
+          </p:cNvPr>
+          <p:cNvCxnSpPr>
+            <a:cxnSpLocks/>
+          </p:cNvCxnSpPr>
+          <p:nvPr/>
+        </p:nvCxnSpPr>
+        <p:spPr>
+          <a:xfrm rot="10800000" flipV="1">
+            <a:off x="4161932" y="5450188"/>
+            <a:ext cx="2828187" cy="241210"/>
+          </a:xfrm>
+          <a:prstGeom prst="bentConnector3">
+            <a:avLst>
+              <a:gd name="adj1" fmla="val 50000"/>
+            </a:avLst>
+          </a:prstGeom>
+          <a:ln w="44450" cap="flat" cmpd="sng" algn="ctr">
+            <a:solidFill>
+              <a:srgbClr val="FF0000"/>
+            </a:solidFill>
+            <a:prstDash val="solid"/>
+            <a:round/>
+            <a:headEnd type="oval" w="med" len="med"/>
+            <a:tailEnd type="oval" w="med" len="med"/>
+          </a:ln>
+        </p:spPr>
+        <p:style>
+          <a:lnRef idx="0">
+            <a:scrgbClr r="0" g="0" b="0"/>
+          </a:lnRef>
+          <a:fillRef idx="0">
+            <a:scrgbClr r="0" g="0" b="0"/>
+          </a:fillRef>
+          <a:effectRef idx="0">
+            <a:scrgbClr r="0" g="0" b="0"/>
+          </a:effectRef>
+          <a:fontRef idx="minor">
+            <a:schemeClr val="tx1"/>
+          </a:fontRef>
+        </p:style>
+      </p:cxnSp>
+      <p:pic>
+        <p:nvPicPr>
+          <p:cNvPr id="1043" name="Picture 6" descr="1/8W 5%  1K OHM CF RES">
+            <a:extLst>
+              <a:ext uri="{FF2B5EF4-FFF2-40B4-BE49-F238E27FC236}">
+                <a16:creationId xmlns:a16="http://schemas.microsoft.com/office/drawing/2014/main" id="{F6FE29D6-D57B-0178-12F7-25C6B9DA8C37}"/>
+              </a:ext>
+            </a:extLst>
+          </p:cNvPr>
+          <p:cNvPicPr>
+            <a:picLocks noChangeAspect="1" noChangeArrowheads="1"/>
+          </p:cNvPicPr>
+          <p:nvPr/>
+        </p:nvPicPr>
+        <p:blipFill rotWithShape="1">
+          <a:blip r:embed="rId4">
+            <a:extLst>
+              <a:ext uri="{28A0092B-C50C-407E-A947-70E740481C1C}">
+                <a14:useLocalDpi xmlns:a14="http://schemas.microsoft.com/office/drawing/2010/main" val="0"/>
+              </a:ext>
+            </a:extLst>
+          </a:blip>
+          <a:srcRect l="28893" t="39812" r="29208" b="46984"/>
+          <a:stretch/>
+        </p:blipFill>
+        <p:spPr bwMode="auto">
+          <a:xfrm rot="6793647" flipV="1">
+            <a:off x="3860743" y="5069051"/>
+            <a:ext cx="797303" cy="108429"/>
+          </a:xfrm>
+          <a:prstGeom prst="rect">
+            <a:avLst/>
+          </a:prstGeom>
+          <a:noFill/>
+          <a:extLst>
+            <a:ext uri="{909E8E84-426E-40DD-AFC4-6F175D3DCCD1}">
+              <a14:hiddenFill xmlns:a14="http://schemas.microsoft.com/office/drawing/2010/main">
+                <a:solidFill>
+                  <a:srgbClr val="FFFFFF"/>
+                </a:solidFill>
+              </a14:hiddenFill>
+            </a:ext>
+          </a:extLst>
+        </p:spPr>
+      </p:pic>
+      <p:pic>
+        <p:nvPicPr>
+          <p:cNvPr id="1044" name="Picture 6" descr="1/8W 5%  1K OHM CF RES">
+            <a:extLst>
+              <a:ext uri="{FF2B5EF4-FFF2-40B4-BE49-F238E27FC236}">
+                <a16:creationId xmlns:a16="http://schemas.microsoft.com/office/drawing/2014/main" id="{8C5BC16B-0493-7421-A33C-505943F25861}"/>
+              </a:ext>
+            </a:extLst>
+          </p:cNvPr>
+          <p:cNvPicPr>
+            <a:picLocks noChangeAspect="1" noChangeArrowheads="1"/>
+          </p:cNvPicPr>
+          <p:nvPr/>
+        </p:nvPicPr>
+        <p:blipFill rotWithShape="1">
+          <a:blip r:embed="rId4">
+            <a:extLst>
+              <a:ext uri="{28A0092B-C50C-407E-A947-70E740481C1C}">
+                <a14:useLocalDpi xmlns:a14="http://schemas.microsoft.com/office/drawing/2010/main" val="0"/>
+              </a:ext>
+            </a:extLst>
+          </a:blip>
+          <a:srcRect l="28893" t="39812" r="29208" b="46984"/>
+          <a:stretch/>
+        </p:blipFill>
+        <p:spPr bwMode="auto">
+          <a:xfrm>
+            <a:off x="4389502" y="5378584"/>
+            <a:ext cx="1109221" cy="163862"/>
+          </a:xfrm>
+          <a:prstGeom prst="rect">
+            <a:avLst/>
+          </a:prstGeom>
+          <a:noFill/>
+          <a:extLst>
+            <a:ext uri="{909E8E84-426E-40DD-AFC4-6F175D3DCCD1}">
+              <a14:hiddenFill xmlns:a14="http://schemas.microsoft.com/office/drawing/2010/main">
+                <a:solidFill>
+                  <a:srgbClr val="FFFFFF"/>
+                </a:solidFill>
+              </a14:hiddenFill>
+            </a:ext>
+          </a:extLst>
+        </p:spPr>
+      </p:pic>
+      <p:sp>
+        <p:nvSpPr>
+          <p:cNvPr id="1051" name="TextBox 1050">
+            <a:extLst>
+              <a:ext uri="{FF2B5EF4-FFF2-40B4-BE49-F238E27FC236}">
+                <a16:creationId xmlns:a16="http://schemas.microsoft.com/office/drawing/2014/main" id="{A09096C8-2D10-4B1F-5F1B-E6F8490F22DD}"/>
+              </a:ext>
+            </a:extLst>
+          </p:cNvPr>
+          <p:cNvSpPr txBox="1"/>
+          <p:nvPr/>
+        </p:nvSpPr>
+        <p:spPr>
+          <a:xfrm>
+            <a:off x="4326563" y="3858579"/>
+            <a:ext cx="604653" cy="523220"/>
+          </a:xfrm>
+          <a:prstGeom prst="rect">
+            <a:avLst/>
+          </a:prstGeom>
+          <a:solidFill>
+            <a:srgbClr val="FFFF00"/>
+          </a:solidFill>
+          <a:ln>
+            <a:solidFill>
+              <a:srgbClr val="FFFF00"/>
+            </a:solidFill>
+          </a:ln>
+        </p:spPr>
+        <p:txBody>
+          <a:bodyPr wrap="none" rtlCol="0">
+            <a:spAutoFit/>
+          </a:bodyPr>
+          <a:lstStyle/>
+          <a:p>
+            <a:pPr algn="ctr"/>
+            <a:r>
+              <a:rPr lang="en-US" sz="1400" dirty="0"/>
+              <a:t>A0</a:t>
+            </a:r>
+          </a:p>
+          <a:p>
+            <a:pPr algn="ctr"/>
+            <a:r>
+              <a:rPr lang="en-US" sz="1400" dirty="0"/>
+              <a:t>+3.3V</a:t>
+            </a:r>
+          </a:p>
+        </p:txBody>
+      </p:sp>
+      <p:cxnSp>
+        <p:nvCxnSpPr>
+          <p:cNvPr id="1055" name="Elbow Connector 1054">
+            <a:extLst>
+              <a:ext uri="{FF2B5EF4-FFF2-40B4-BE49-F238E27FC236}">
+                <a16:creationId xmlns:a16="http://schemas.microsoft.com/office/drawing/2014/main" id="{6223BA40-B929-30D2-AC1A-FEE4B82D9B7E}"/>
+              </a:ext>
+            </a:extLst>
+          </p:cNvPr>
+          <p:cNvCxnSpPr>
+            <a:cxnSpLocks/>
+          </p:cNvCxnSpPr>
+          <p:nvPr/>
+        </p:nvCxnSpPr>
+        <p:spPr>
+          <a:xfrm rot="5400000" flipH="1" flipV="1">
+            <a:off x="4342530" y="4465925"/>
+            <a:ext cx="247812" cy="12700"/>
+          </a:xfrm>
+          <a:prstGeom prst="bentConnector3">
+            <a:avLst>
+              <a:gd name="adj1" fmla="val 50000"/>
+            </a:avLst>
+          </a:prstGeom>
+          <a:ln w="44450" cap="flat" cmpd="sng" algn="ctr">
+            <a:solidFill>
+              <a:schemeClr val="accent2"/>
+            </a:solidFill>
+            <a:prstDash val="solid"/>
+            <a:round/>
+            <a:headEnd type="oval" w="med" len="med"/>
+            <a:tailEnd type="oval" w="med" len="med"/>
+          </a:ln>
+        </p:spPr>
+        <p:style>
+          <a:lnRef idx="0">
+            <a:scrgbClr r="0" g="0" b="0"/>
+          </a:lnRef>
+          <a:fillRef idx="0">
+            <a:scrgbClr r="0" g="0" b="0"/>
+          </a:fillRef>
+          <a:effectRef idx="0">
+            <a:scrgbClr r="0" g="0" b="0"/>
+          </a:effectRef>
+          <a:fontRef idx="minor">
+            <a:schemeClr val="tx1"/>
+          </a:fontRef>
+        </p:style>
+      </p:cxnSp>
+      <p:cxnSp>
+        <p:nvCxnSpPr>
+          <p:cNvPr id="1098" name="Elbow Connector 1097">
+            <a:extLst>
+              <a:ext uri="{FF2B5EF4-FFF2-40B4-BE49-F238E27FC236}">
+                <a16:creationId xmlns:a16="http://schemas.microsoft.com/office/drawing/2014/main" id="{4F25CA6B-C1E8-ED3D-52AE-9F45973A4784}"/>
+              </a:ext>
+            </a:extLst>
+          </p:cNvPr>
+          <p:cNvCxnSpPr>
+            <a:cxnSpLocks/>
+          </p:cNvCxnSpPr>
+          <p:nvPr/>
+        </p:nvCxnSpPr>
+        <p:spPr>
+          <a:xfrm>
+            <a:off x="6439091" y="5147618"/>
+            <a:ext cx="288329" cy="7876"/>
+          </a:xfrm>
+          <a:prstGeom prst="bentConnector3">
+            <a:avLst>
+              <a:gd name="adj1" fmla="val 50000"/>
+            </a:avLst>
+          </a:prstGeom>
+          <a:ln w="44450" cap="flat" cmpd="sng" algn="ctr">
+            <a:solidFill>
+              <a:srgbClr val="00B0F0"/>
+            </a:solidFill>
+            <a:prstDash val="solid"/>
+            <a:round/>
+            <a:headEnd type="oval" w="med" len="med"/>
+            <a:tailEnd type="oval" w="med" len="med"/>
+          </a:ln>
+        </p:spPr>
+        <p:style>
+          <a:lnRef idx="0">
+            <a:scrgbClr r="0" g="0" b="0"/>
+          </a:lnRef>
+          <a:fillRef idx="0">
+            <a:scrgbClr r="0" g="0" b="0"/>
+          </a:fillRef>
+          <a:effectRef idx="0">
+            <a:scrgbClr r="0" g="0" b="0"/>
+          </a:effectRef>
+          <a:fontRef idx="minor">
+            <a:schemeClr val="tx1"/>
+          </a:fontRef>
+        </p:style>
+      </p:cxnSp>
+      <p:cxnSp>
+        <p:nvCxnSpPr>
+          <p:cNvPr id="1100" name="Elbow Connector 1099">
+            <a:extLst>
+              <a:ext uri="{FF2B5EF4-FFF2-40B4-BE49-F238E27FC236}">
+                <a16:creationId xmlns:a16="http://schemas.microsoft.com/office/drawing/2014/main" id="{1442A75A-FD3C-BFE4-DEE5-BAA64B78087B}"/>
+              </a:ext>
+            </a:extLst>
+          </p:cNvPr>
+          <p:cNvCxnSpPr>
+            <a:cxnSpLocks/>
+          </p:cNvCxnSpPr>
+          <p:nvPr/>
+        </p:nvCxnSpPr>
+        <p:spPr>
+          <a:xfrm flipV="1">
+            <a:off x="5893868" y="5155494"/>
+            <a:ext cx="262698" cy="6914"/>
+          </a:xfrm>
+          <a:prstGeom prst="bentConnector3">
+            <a:avLst>
+              <a:gd name="adj1" fmla="val 50000"/>
+            </a:avLst>
+          </a:prstGeom>
+          <a:ln w="44450" cap="flat" cmpd="sng" algn="ctr">
+            <a:solidFill>
+              <a:srgbClr val="00B0F0"/>
+            </a:solidFill>
+            <a:prstDash val="solid"/>
+            <a:round/>
+            <a:headEnd type="oval" w="med" len="med"/>
+            <a:tailEnd type="oval" w="med" len="med"/>
+          </a:ln>
+        </p:spPr>
+        <p:style>
+          <a:lnRef idx="0">
+            <a:scrgbClr r="0" g="0" b="0"/>
+          </a:lnRef>
+          <a:fillRef idx="0">
+            <a:scrgbClr r="0" g="0" b="0"/>
+          </a:fillRef>
+          <a:effectRef idx="0">
+            <a:scrgbClr r="0" g="0" b="0"/>
+          </a:effectRef>
+          <a:fontRef idx="minor">
+            <a:schemeClr val="tx1"/>
+          </a:fontRef>
+        </p:style>
+      </p:cxnSp>
+      <p:pic>
+        <p:nvPicPr>
+          <p:cNvPr id="1108" name="Picture 10" descr="DIP Switch- 3 Positions, 2.54mm - Pack of 5">
+            <a:extLst>
+              <a:ext uri="{FF2B5EF4-FFF2-40B4-BE49-F238E27FC236}">
+                <a16:creationId xmlns:a16="http://schemas.microsoft.com/office/drawing/2014/main" id="{77F43900-FE1D-43D0-7B6F-B1477C4BDFB8}"/>
+              </a:ext>
+            </a:extLst>
+          </p:cNvPr>
+          <p:cNvPicPr>
+            <a:picLocks noChangeAspect="1" noChangeArrowheads="1"/>
+          </p:cNvPicPr>
+          <p:nvPr/>
+        </p:nvPicPr>
+        <p:blipFill rotWithShape="1">
+          <a:blip r:embed="rId5">
+            <a:extLst>
+              <a:ext uri="{28A0092B-C50C-407E-A947-70E740481C1C}">
+                <a14:useLocalDpi xmlns:a14="http://schemas.microsoft.com/office/drawing/2010/main" val="0"/>
+              </a:ext>
+            </a:extLst>
+          </a:blip>
+          <a:srcRect l="31168" t="29330" r="32761" b="27854"/>
+          <a:stretch/>
+        </p:blipFill>
+        <p:spPr bwMode="auto">
+          <a:xfrm>
+            <a:off x="6096000" y="3769758"/>
+            <a:ext cx="746905" cy="886577"/>
+          </a:xfrm>
+          <a:prstGeom prst="rect">
+            <a:avLst/>
+          </a:prstGeom>
+          <a:noFill/>
+          <a:extLst>
+            <a:ext uri="{909E8E84-426E-40DD-AFC4-6F175D3DCCD1}">
+              <a14:hiddenFill xmlns:a14="http://schemas.microsoft.com/office/drawing/2010/main">
+                <a:solidFill>
+                  <a:srgbClr val="FFFFFF"/>
+                </a:solidFill>
+              </a14:hiddenFill>
+            </a:ext>
+          </a:extLst>
+        </p:spPr>
+      </p:pic>
+      <p:sp>
+        <p:nvSpPr>
+          <p:cNvPr id="1070" name="TextBox 1069">
+            <a:extLst>
+              <a:ext uri="{FF2B5EF4-FFF2-40B4-BE49-F238E27FC236}">
+                <a16:creationId xmlns:a16="http://schemas.microsoft.com/office/drawing/2014/main" id="{8BB0A442-E903-624F-BEE3-4C04416C61D9}"/>
+              </a:ext>
+            </a:extLst>
+          </p:cNvPr>
+          <p:cNvSpPr txBox="1"/>
+          <p:nvPr/>
+        </p:nvSpPr>
+        <p:spPr>
+          <a:xfrm>
+            <a:off x="5953644" y="4977742"/>
+            <a:ext cx="574196" cy="369332"/>
+          </a:xfrm>
+          <a:prstGeom prst="rect">
+            <a:avLst/>
+          </a:prstGeom>
+          <a:solidFill>
+            <a:srgbClr val="FFFF00"/>
+          </a:solidFill>
+          <a:ln>
+            <a:solidFill>
+              <a:srgbClr val="FFFF00"/>
+            </a:solidFill>
+          </a:ln>
+        </p:spPr>
+        <p:txBody>
+          <a:bodyPr wrap="none" rtlCol="0">
+            <a:spAutoFit/>
+          </a:bodyPr>
+          <a:lstStyle/>
+          <a:p>
+            <a:r>
+              <a:rPr lang="en-US" dirty="0" err="1"/>
+              <a:t>Gnd</a:t>
+            </a:r>
+            <a:endParaRPr lang="en-US" dirty="0"/>
+          </a:p>
+        </p:txBody>
+      </p:sp>
+    </p:spTree>
+    <p:extLst>
+      <p:ext uri="{BB962C8B-B14F-4D97-AF65-F5344CB8AC3E}">
+        <p14:creationId xmlns:p14="http://schemas.microsoft.com/office/powerpoint/2010/main" val="3235326073"/>
+      </p:ext>
+    </p:extLst>
+  </p:cSld>
+  <p:clrMapOvr>
+    <a:masterClrMapping/>
+  </p:clrMapOvr>
+</p:sld>
+</file>
+
+<file path=ppt/slides/slide4.xml><?xml version="1.0" encoding="utf-8"?>
+<p:sld xmlns:a="http://schemas.openxmlformats.org/drawingml/2006/main" xmlns:r="http://schemas.openxmlformats.org/officeDocument/2006/relationships" xmlns:p="http://schemas.openxmlformats.org/presentationml/2006/main">
+  <p:cSld>
+    <p:bg>
+      <p:bgPr>
+        <a:solidFill>
+          <a:schemeClr val="bg1"/>
+        </a:solidFill>
+        <a:effectLst/>
+      </p:bgPr>
+    </p:bg>
+    <p:spTree>
+      <p:nvGrpSpPr>
+        <p:cNvPr id="1" name="">
+          <a:extLst>
+            <a:ext uri="{FF2B5EF4-FFF2-40B4-BE49-F238E27FC236}">
+              <a16:creationId xmlns:a16="http://schemas.microsoft.com/office/drawing/2014/main" id="{73CC6D1E-A056-1E0A-CB75-2004A743AE01}"/>
+            </a:ext>
+          </a:extLst>
+        </p:cNvPr>
+        <p:cNvGrpSpPr/>
+        <p:nvPr/>
+      </p:nvGrpSpPr>
+      <p:grpSpPr>
+        <a:xfrm>
+          <a:off x="0" y="0"/>
+          <a:ext cx="0" cy="0"/>
+          <a:chOff x="0" y="0"/>
+          <a:chExt cx="0" cy="0"/>
+        </a:xfrm>
+      </p:grpSpPr>
+      <p:pic>
+        <p:nvPicPr>
+          <p:cNvPr id="3" name="Picture 2">
+            <a:extLst>
+              <a:ext uri="{FF2B5EF4-FFF2-40B4-BE49-F238E27FC236}">
+                <a16:creationId xmlns:a16="http://schemas.microsoft.com/office/drawing/2014/main" id="{2D186BD1-E575-2B63-4210-36ACA849F708}"/>
+              </a:ext>
+            </a:extLst>
+          </p:cNvPr>
+          <p:cNvPicPr>
+            <a:picLocks noChangeAspect="1" noChangeArrowheads="1"/>
+          </p:cNvPicPr>
+          <p:nvPr/>
+        </p:nvPicPr>
+        <p:blipFill rotWithShape="1">
+          <a:blip r:embed="rId2">
+            <a:extLst>
+              <a:ext uri="{28A0092B-C50C-407E-A947-70E740481C1C}">
+                <a14:useLocalDpi xmlns:a14="http://schemas.microsoft.com/office/drawing/2010/main" val="0"/>
+              </a:ext>
+            </a:extLst>
+          </a:blip>
+          <a:srcRect r="52057" b="53266"/>
+          <a:stretch/>
+        </p:blipFill>
+        <p:spPr bwMode="auto">
+          <a:xfrm>
+            <a:off x="4346397" y="2354548"/>
+            <a:ext cx="4144142" cy="3205017"/>
+          </a:xfrm>
+          <a:prstGeom prst="rect">
+            <a:avLst/>
+          </a:prstGeom>
+          <a:noFill/>
+          <a:extLst>
+            <a:ext uri="{909E8E84-426E-40DD-AFC4-6F175D3DCCD1}">
+              <a14:hiddenFill xmlns:a14="http://schemas.microsoft.com/office/drawing/2010/main">
+                <a:solidFill>
+                  <a:srgbClr val="FFFFFF"/>
+                </a:solidFill>
+              </a14:hiddenFill>
+            </a:ext>
+          </a:extLst>
+        </p:spPr>
+      </p:pic>
+      <p:cxnSp>
+        <p:nvCxnSpPr>
+          <p:cNvPr id="42" name="Elbow Connector 41">
+            <a:extLst>
+              <a:ext uri="{FF2B5EF4-FFF2-40B4-BE49-F238E27FC236}">
+                <a16:creationId xmlns:a16="http://schemas.microsoft.com/office/drawing/2014/main" id="{623248DB-EF94-5921-EA87-EBE97AE75944}"/>
+              </a:ext>
+            </a:extLst>
+          </p:cNvPr>
+          <p:cNvCxnSpPr>
+            <a:cxnSpLocks/>
+          </p:cNvCxnSpPr>
+          <p:nvPr/>
+        </p:nvCxnSpPr>
+        <p:spPr>
+          <a:xfrm flipV="1">
+            <a:off x="5754193" y="2690648"/>
+            <a:ext cx="2454386" cy="1685254"/>
+          </a:xfrm>
+          <a:prstGeom prst="bentConnector3">
+            <a:avLst>
+              <a:gd name="adj1" fmla="val 90681"/>
+            </a:avLst>
+          </a:prstGeom>
+          <a:ln w="44450" cap="flat" cmpd="sng" algn="ctr">
+            <a:solidFill>
+              <a:srgbClr val="73FB79"/>
+            </a:solidFill>
+            <a:prstDash val="solid"/>
+            <a:round/>
+            <a:headEnd type="oval" w="med" len="med"/>
+            <a:tailEnd type="oval" w="med" len="med"/>
+          </a:ln>
+        </p:spPr>
+        <p:style>
+          <a:lnRef idx="0">
+            <a:scrgbClr r="0" g="0" b="0"/>
+          </a:lnRef>
+          <a:fillRef idx="0">
+            <a:scrgbClr r="0" g="0" b="0"/>
+          </a:fillRef>
+          <a:effectRef idx="0">
+            <a:scrgbClr r="0" g="0" b="0"/>
+          </a:effectRef>
+          <a:fontRef idx="minor">
+            <a:schemeClr val="tx1"/>
+          </a:fontRef>
+        </p:style>
+      </p:cxnSp>
+      <p:cxnSp>
+        <p:nvCxnSpPr>
+          <p:cNvPr id="43" name="Elbow Connector 42">
+            <a:extLst>
+              <a:ext uri="{FF2B5EF4-FFF2-40B4-BE49-F238E27FC236}">
+                <a16:creationId xmlns:a16="http://schemas.microsoft.com/office/drawing/2014/main" id="{5FFA945E-1174-10C3-419E-F73DE8526221}"/>
+              </a:ext>
+            </a:extLst>
+          </p:cNvPr>
+          <p:cNvCxnSpPr>
+            <a:cxnSpLocks/>
+          </p:cNvCxnSpPr>
+          <p:nvPr/>
+        </p:nvCxnSpPr>
+        <p:spPr>
+          <a:xfrm rot="10800000" flipV="1">
+            <a:off x="7748150" y="4137165"/>
+            <a:ext cx="3545180" cy="65694"/>
+          </a:xfrm>
+          <a:prstGeom prst="bentConnector3">
+            <a:avLst>
+              <a:gd name="adj1" fmla="val 36688"/>
+            </a:avLst>
+          </a:prstGeom>
+          <a:ln w="44450" cap="flat" cmpd="sng" algn="ctr">
+            <a:solidFill>
+              <a:srgbClr val="00B0F0"/>
+            </a:solidFill>
+            <a:prstDash val="solid"/>
+            <a:round/>
+            <a:headEnd type="oval" w="med" len="med"/>
+            <a:tailEnd type="oval" w="med" len="med"/>
+          </a:ln>
+        </p:spPr>
+        <p:style>
+          <a:lnRef idx="0">
+            <a:scrgbClr r="0" g="0" b="0"/>
+          </a:lnRef>
+          <a:fillRef idx="0">
+            <a:scrgbClr r="0" g="0" b="0"/>
+          </a:fillRef>
+          <a:effectRef idx="0">
+            <a:scrgbClr r="0" g="0" b="0"/>
+          </a:effectRef>
+          <a:fontRef idx="minor">
+            <a:schemeClr val="tx1"/>
+          </a:fontRef>
+        </p:style>
+      </p:cxnSp>
+      <p:sp>
+        <p:nvSpPr>
+          <p:cNvPr id="47" name="TextBox 46">
+            <a:extLst>
+              <a:ext uri="{FF2B5EF4-FFF2-40B4-BE49-F238E27FC236}">
+                <a16:creationId xmlns:a16="http://schemas.microsoft.com/office/drawing/2014/main" id="{15BC8453-62AF-7DE5-B008-5753687A49FB}"/>
+              </a:ext>
+            </a:extLst>
+          </p:cNvPr>
+          <p:cNvSpPr txBox="1"/>
+          <p:nvPr/>
+        </p:nvSpPr>
+        <p:spPr>
+          <a:xfrm>
+            <a:off x="4818049" y="153690"/>
+            <a:ext cx="2172069" cy="707886"/>
+          </a:xfrm>
+          <a:prstGeom prst="rect">
+            <a:avLst/>
+          </a:prstGeom>
+          <a:noFill/>
+        </p:spPr>
+        <p:txBody>
+          <a:bodyPr wrap="none" rtlCol="0">
+            <a:spAutoFit/>
+          </a:bodyPr>
+          <a:lstStyle/>
+          <a:p>
+            <a:r>
+              <a:rPr lang="en-US" sz="2000" dirty="0"/>
+              <a:t>Basic I/O Board I2C</a:t>
+            </a:r>
+          </a:p>
+          <a:p>
+            <a:r>
+              <a:rPr lang="en-US" sz="2000" dirty="0"/>
+              <a:t>Temp, Flow, ADC</a:t>
+            </a:r>
+          </a:p>
+        </p:txBody>
+      </p:sp>
+      <p:cxnSp>
+        <p:nvCxnSpPr>
+          <p:cNvPr id="20" name="Elbow Connector 19">
+            <a:extLst>
+              <a:ext uri="{FF2B5EF4-FFF2-40B4-BE49-F238E27FC236}">
+                <a16:creationId xmlns:a16="http://schemas.microsoft.com/office/drawing/2014/main" id="{3177095D-0D5E-A109-5966-4FF12C104158}"/>
+              </a:ext>
+            </a:extLst>
+          </p:cNvPr>
+          <p:cNvCxnSpPr>
+            <a:cxnSpLocks/>
+          </p:cNvCxnSpPr>
+          <p:nvPr/>
+        </p:nvCxnSpPr>
+        <p:spPr>
+          <a:xfrm flipV="1">
+            <a:off x="5748890" y="2686893"/>
+            <a:ext cx="1850092" cy="1539137"/>
+          </a:xfrm>
+          <a:prstGeom prst="bentConnector3">
+            <a:avLst>
+              <a:gd name="adj1" fmla="val 81814"/>
+            </a:avLst>
+          </a:prstGeom>
+          <a:ln w="44450" cap="flat" cmpd="sng" algn="ctr">
+            <a:solidFill>
+              <a:srgbClr val="73FB79"/>
+            </a:solidFill>
+            <a:prstDash val="solid"/>
+            <a:round/>
+            <a:headEnd type="oval" w="med" len="med"/>
+            <a:tailEnd type="oval" w="med" len="med"/>
+          </a:ln>
+        </p:spPr>
+        <p:style>
+          <a:lnRef idx="0">
+            <a:scrgbClr r="0" g="0" b="0"/>
+          </a:lnRef>
+          <a:fillRef idx="0">
+            <a:scrgbClr r="0" g="0" b="0"/>
+          </a:fillRef>
+          <a:effectRef idx="0">
+            <a:scrgbClr r="0" g="0" b="0"/>
+          </a:effectRef>
+          <a:fontRef idx="minor">
+            <a:schemeClr val="tx1"/>
+          </a:fontRef>
+        </p:style>
+      </p:cxnSp>
+      <p:cxnSp>
+        <p:nvCxnSpPr>
+          <p:cNvPr id="26" name="Elbow Connector 25">
+            <a:extLst>
+              <a:ext uri="{FF2B5EF4-FFF2-40B4-BE49-F238E27FC236}">
+                <a16:creationId xmlns:a16="http://schemas.microsoft.com/office/drawing/2014/main" id="{87158ACA-0EF0-F8A3-DFD1-13054F47DC10}"/>
+              </a:ext>
+            </a:extLst>
+          </p:cNvPr>
+          <p:cNvCxnSpPr>
+            <a:cxnSpLocks/>
+          </p:cNvCxnSpPr>
+          <p:nvPr/>
+        </p:nvCxnSpPr>
+        <p:spPr>
+          <a:xfrm rot="5400000" flipH="1" flipV="1">
+            <a:off x="5328783" y="3110755"/>
+            <a:ext cx="1355493" cy="515280"/>
+          </a:xfrm>
+          <a:prstGeom prst="bentConnector3">
+            <a:avLst>
+              <a:gd name="adj1" fmla="val 50000"/>
+            </a:avLst>
+          </a:prstGeom>
+          <a:ln w="44450" cap="flat" cmpd="sng" algn="ctr">
+            <a:solidFill>
+              <a:srgbClr val="73FB79"/>
+            </a:solidFill>
+            <a:prstDash val="solid"/>
+            <a:round/>
+            <a:headEnd type="oval" w="med" len="med"/>
+            <a:tailEnd type="oval" w="med" len="med"/>
+          </a:ln>
+        </p:spPr>
+        <p:style>
+          <a:lnRef idx="0">
+            <a:scrgbClr r="0" g="0" b="0"/>
+          </a:lnRef>
+          <a:fillRef idx="0">
+            <a:scrgbClr r="0" g="0" b="0"/>
+          </a:fillRef>
+          <a:effectRef idx="0">
+            <a:scrgbClr r="0" g="0" b="0"/>
+          </a:effectRef>
+          <a:fontRef idx="minor">
+            <a:schemeClr val="tx1"/>
+          </a:fontRef>
+        </p:style>
+      </p:cxnSp>
+      <p:cxnSp>
+        <p:nvCxnSpPr>
+          <p:cNvPr id="55" name="Elbow Connector 54">
+            <a:extLst>
+              <a:ext uri="{FF2B5EF4-FFF2-40B4-BE49-F238E27FC236}">
+                <a16:creationId xmlns:a16="http://schemas.microsoft.com/office/drawing/2014/main" id="{71E7F950-FA1A-9431-7F00-DDA7CA6D4361}"/>
+              </a:ext>
+            </a:extLst>
+          </p:cNvPr>
+          <p:cNvCxnSpPr>
+            <a:cxnSpLocks/>
+          </p:cNvCxnSpPr>
+          <p:nvPr/>
+        </p:nvCxnSpPr>
+        <p:spPr>
+          <a:xfrm rot="10800000" flipV="1">
+            <a:off x="7711502" y="3890792"/>
+            <a:ext cx="3358923" cy="161464"/>
+          </a:xfrm>
+          <a:prstGeom prst="bentConnector3">
+            <a:avLst>
+              <a:gd name="adj1" fmla="val 50000"/>
+            </a:avLst>
+          </a:prstGeom>
+          <a:ln w="44450" cap="flat" cmpd="sng" algn="ctr">
+            <a:solidFill>
+              <a:srgbClr val="00B0F0"/>
+            </a:solidFill>
+            <a:prstDash val="solid"/>
+            <a:round/>
+            <a:headEnd type="oval" w="med" len="med"/>
+            <a:tailEnd type="oval" w="med" len="med"/>
+          </a:ln>
+        </p:spPr>
+        <p:style>
+          <a:lnRef idx="0">
+            <a:scrgbClr r="0" g="0" b="0"/>
+          </a:lnRef>
+          <a:fillRef idx="0">
+            <a:scrgbClr r="0" g="0" b="0"/>
+          </a:fillRef>
+          <a:effectRef idx="0">
+            <a:scrgbClr r="0" g="0" b="0"/>
+          </a:effectRef>
+          <a:fontRef idx="minor">
+            <a:schemeClr val="tx1"/>
+          </a:fontRef>
+        </p:style>
+      </p:cxnSp>
+      <p:cxnSp>
+        <p:nvCxnSpPr>
+          <p:cNvPr id="56" name="Elbow Connector 55">
+            <a:extLst>
+              <a:ext uri="{FF2B5EF4-FFF2-40B4-BE49-F238E27FC236}">
+                <a16:creationId xmlns:a16="http://schemas.microsoft.com/office/drawing/2014/main" id="{6B513721-3E11-90DF-AB68-3B5F9BBB50FF}"/>
+              </a:ext>
+            </a:extLst>
+          </p:cNvPr>
+          <p:cNvCxnSpPr>
+            <a:cxnSpLocks/>
+          </p:cNvCxnSpPr>
+          <p:nvPr/>
+        </p:nvCxnSpPr>
+        <p:spPr>
+          <a:xfrm rot="10800000" flipV="1">
+            <a:off x="7748150" y="3533275"/>
+            <a:ext cx="3133864" cy="267715"/>
+          </a:xfrm>
+          <a:prstGeom prst="bentConnector3">
+            <a:avLst>
+              <a:gd name="adj1" fmla="val 50000"/>
+            </a:avLst>
+          </a:prstGeom>
+          <a:ln w="44450" cap="flat" cmpd="sng" algn="ctr">
+            <a:solidFill>
+              <a:srgbClr val="00B0F0"/>
+            </a:solidFill>
+            <a:prstDash val="solid"/>
+            <a:round/>
+            <a:headEnd type="oval" w="med" len="med"/>
+            <a:tailEnd type="oval" w="med" len="med"/>
+          </a:ln>
+        </p:spPr>
+        <p:style>
+          <a:lnRef idx="0">
+            <a:scrgbClr r="0" g="0" b="0"/>
+          </a:lnRef>
+          <a:fillRef idx="0">
+            <a:scrgbClr r="0" g="0" b="0"/>
+          </a:fillRef>
+          <a:effectRef idx="0">
+            <a:scrgbClr r="0" g="0" b="0"/>
+          </a:effectRef>
+          <a:fontRef idx="minor">
+            <a:schemeClr val="tx1"/>
+          </a:fontRef>
+        </p:style>
+      </p:cxnSp>
+      <p:sp>
+        <p:nvSpPr>
+          <p:cNvPr id="57" name="TextBox 56">
+            <a:extLst>
+              <a:ext uri="{FF2B5EF4-FFF2-40B4-BE49-F238E27FC236}">
+                <a16:creationId xmlns:a16="http://schemas.microsoft.com/office/drawing/2014/main" id="{FEB820D2-05EB-DE53-2A15-228DF0FFC941}"/>
+              </a:ext>
+            </a:extLst>
+          </p:cNvPr>
+          <p:cNvSpPr txBox="1"/>
+          <p:nvPr/>
+        </p:nvSpPr>
+        <p:spPr>
+          <a:xfrm>
+            <a:off x="10362474" y="3431347"/>
+            <a:ext cx="1150535" cy="738664"/>
+          </a:xfrm>
+          <a:prstGeom prst="rect">
+            <a:avLst/>
+          </a:prstGeom>
+          <a:noFill/>
+        </p:spPr>
+        <p:txBody>
+          <a:bodyPr wrap="square" rtlCol="0">
+            <a:spAutoFit/>
+          </a:bodyPr>
+          <a:lstStyle/>
+          <a:p>
+            <a:r>
+              <a:rPr lang="en-US" sz="1400" dirty="0"/>
+              <a:t>Temp Sensor</a:t>
+            </a:r>
+          </a:p>
+          <a:p>
+            <a:r>
+              <a:rPr lang="en-US" sz="1400" dirty="0"/>
+              <a:t>Flow Sensor</a:t>
+            </a:r>
+          </a:p>
+          <a:p>
+            <a:r>
+              <a:rPr lang="en-US" sz="1400" dirty="0"/>
+              <a:t>Analog +v</a:t>
+            </a:r>
+          </a:p>
+        </p:txBody>
+      </p:sp>
+      <p:cxnSp>
+        <p:nvCxnSpPr>
+          <p:cNvPr id="60" name="Elbow Connector 59">
+            <a:extLst>
+              <a:ext uri="{FF2B5EF4-FFF2-40B4-BE49-F238E27FC236}">
+                <a16:creationId xmlns:a16="http://schemas.microsoft.com/office/drawing/2014/main" id="{313B8BDC-BE8D-9A90-DC89-4EA7AEED2112}"/>
+              </a:ext>
+            </a:extLst>
+          </p:cNvPr>
+          <p:cNvCxnSpPr>
+            <a:cxnSpLocks/>
+          </p:cNvCxnSpPr>
+          <p:nvPr/>
+        </p:nvCxnSpPr>
+        <p:spPr>
+          <a:xfrm rot="16200000" flipV="1">
+            <a:off x="6671641" y="2756142"/>
+            <a:ext cx="1104941" cy="973953"/>
+          </a:xfrm>
+          <a:prstGeom prst="bentConnector3">
+            <a:avLst>
+              <a:gd name="adj1" fmla="val 50000"/>
+            </a:avLst>
+          </a:prstGeom>
+          <a:ln w="44450" cap="flat" cmpd="sng" algn="ctr">
+            <a:solidFill>
+              <a:srgbClr val="FFFF00"/>
+            </a:solidFill>
+            <a:prstDash val="solid"/>
+            <a:round/>
+            <a:headEnd type="oval" w="med" len="med"/>
+            <a:tailEnd type="oval" w="med" len="med"/>
+          </a:ln>
+        </p:spPr>
+        <p:style>
+          <a:lnRef idx="0">
+            <a:scrgbClr r="0" g="0" b="0"/>
+          </a:lnRef>
+          <a:fillRef idx="0">
+            <a:scrgbClr r="0" g="0" b="0"/>
+          </a:fillRef>
+          <a:effectRef idx="0">
+            <a:scrgbClr r="0" g="0" b="0"/>
+          </a:effectRef>
+          <a:fontRef idx="minor">
+            <a:schemeClr val="tx1"/>
+          </a:fontRef>
+        </p:style>
+      </p:cxnSp>
+      <p:cxnSp>
+        <p:nvCxnSpPr>
+          <p:cNvPr id="1024" name="Elbow Connector 1023">
+            <a:extLst>
+              <a:ext uri="{FF2B5EF4-FFF2-40B4-BE49-F238E27FC236}">
+                <a16:creationId xmlns:a16="http://schemas.microsoft.com/office/drawing/2014/main" id="{9D1064D4-AADA-B8BA-B26E-35A78BAC8D53}"/>
+              </a:ext>
+            </a:extLst>
+          </p:cNvPr>
+          <p:cNvCxnSpPr>
+            <a:cxnSpLocks/>
+          </p:cNvCxnSpPr>
+          <p:nvPr/>
+        </p:nvCxnSpPr>
+        <p:spPr>
+          <a:xfrm rot="16200000" flipV="1">
+            <a:off x="6719837" y="3029269"/>
+            <a:ext cx="1333628" cy="648875"/>
+          </a:xfrm>
+          <a:prstGeom prst="bentConnector3">
+            <a:avLst>
+              <a:gd name="adj1" fmla="val 50000"/>
+            </a:avLst>
+          </a:prstGeom>
+          <a:ln w="44450" cap="flat" cmpd="sng" algn="ctr">
+            <a:solidFill>
+              <a:srgbClr val="FFFF00"/>
+            </a:solidFill>
+            <a:prstDash val="solid"/>
+            <a:round/>
+            <a:headEnd type="oval" w="med" len="med"/>
+            <a:tailEnd type="oval" w="med" len="med"/>
+          </a:ln>
+        </p:spPr>
+        <p:style>
+          <a:lnRef idx="0">
+            <a:scrgbClr r="0" g="0" b="0"/>
+          </a:lnRef>
+          <a:fillRef idx="0">
+            <a:scrgbClr r="0" g="0" b="0"/>
+          </a:fillRef>
+          <a:effectRef idx="0">
+            <a:scrgbClr r="0" g="0" b="0"/>
+          </a:effectRef>
+          <a:fontRef idx="minor">
+            <a:schemeClr val="tx1"/>
+          </a:fontRef>
+        </p:style>
+      </p:cxnSp>
+      <p:sp>
+        <p:nvSpPr>
+          <p:cNvPr id="1032" name="TextBox 1031">
+            <a:extLst>
+              <a:ext uri="{FF2B5EF4-FFF2-40B4-BE49-F238E27FC236}">
+                <a16:creationId xmlns:a16="http://schemas.microsoft.com/office/drawing/2014/main" id="{D7BC08B4-0457-AE0F-2760-E464F9D4EA9E}"/>
+              </a:ext>
+            </a:extLst>
+          </p:cNvPr>
+          <p:cNvSpPr txBox="1"/>
+          <p:nvPr/>
+        </p:nvSpPr>
+        <p:spPr>
+          <a:xfrm>
+            <a:off x="7598982" y="4525439"/>
+            <a:ext cx="587020" cy="307777"/>
+          </a:xfrm>
+          <a:prstGeom prst="rect">
+            <a:avLst/>
+          </a:prstGeom>
+          <a:solidFill>
+            <a:schemeClr val="accent1">
+              <a:lumMod val="20000"/>
+              <a:lumOff val="80000"/>
+            </a:schemeClr>
+          </a:solidFill>
+        </p:spPr>
+        <p:txBody>
+          <a:bodyPr wrap="none" rtlCol="0">
+            <a:spAutoFit/>
+          </a:bodyPr>
+          <a:lstStyle/>
+          <a:p>
+            <a:r>
+              <a:rPr lang="en-US" sz="1400" dirty="0"/>
+              <a:t>R1 1k</a:t>
+            </a:r>
+          </a:p>
+        </p:txBody>
+      </p:sp>
+      <p:sp>
+        <p:nvSpPr>
+          <p:cNvPr id="1033" name="TextBox 1032">
+            <a:extLst>
+              <a:ext uri="{FF2B5EF4-FFF2-40B4-BE49-F238E27FC236}">
+                <a16:creationId xmlns:a16="http://schemas.microsoft.com/office/drawing/2014/main" id="{78EE2937-FC36-B739-85B6-8A0231F063CB}"/>
+              </a:ext>
+            </a:extLst>
+          </p:cNvPr>
+          <p:cNvSpPr txBox="1"/>
+          <p:nvPr/>
+        </p:nvSpPr>
+        <p:spPr>
+          <a:xfrm>
+            <a:off x="5884741" y="4733022"/>
+            <a:ext cx="734496" cy="307777"/>
+          </a:xfrm>
+          <a:prstGeom prst="rect">
+            <a:avLst/>
+          </a:prstGeom>
+          <a:solidFill>
+            <a:schemeClr val="accent1">
+              <a:lumMod val="20000"/>
+              <a:lumOff val="80000"/>
+            </a:schemeClr>
+          </a:solidFill>
+        </p:spPr>
+        <p:txBody>
+          <a:bodyPr wrap="none" rtlCol="0">
+            <a:spAutoFit/>
+          </a:bodyPr>
+          <a:lstStyle/>
+          <a:p>
+            <a:r>
+              <a:rPr lang="en-US" sz="1400" dirty="0"/>
+              <a:t>R2 2.2K</a:t>
+            </a:r>
+          </a:p>
+        </p:txBody>
+      </p:sp>
+      <p:pic>
+        <p:nvPicPr>
+          <p:cNvPr id="1043" name="Picture 6" descr="1/8W 5%  1K OHM CF RES">
+            <a:extLst>
+              <a:ext uri="{FF2B5EF4-FFF2-40B4-BE49-F238E27FC236}">
+                <a16:creationId xmlns:a16="http://schemas.microsoft.com/office/drawing/2014/main" id="{F1A19319-DEE4-39F2-6F52-ADEE4D789FDF}"/>
+              </a:ext>
+            </a:extLst>
+          </p:cNvPr>
+          <p:cNvPicPr>
+            <a:picLocks noChangeAspect="1" noChangeArrowheads="1"/>
+          </p:cNvPicPr>
+          <p:nvPr/>
+        </p:nvPicPr>
+        <p:blipFill rotWithShape="1">
+          <a:blip r:embed="rId3">
+            <a:extLst>
+              <a:ext uri="{28A0092B-C50C-407E-A947-70E740481C1C}">
+                <a14:useLocalDpi xmlns:a14="http://schemas.microsoft.com/office/drawing/2010/main" val="0"/>
+              </a:ext>
+            </a:extLst>
+          </a:blip>
+          <a:srcRect l="28893" t="39812" r="29208" b="46984"/>
+          <a:stretch/>
+        </p:blipFill>
+        <p:spPr bwMode="auto">
+          <a:xfrm rot="6793647" flipV="1">
+            <a:off x="7177257" y="4512939"/>
+            <a:ext cx="797303" cy="108429"/>
+          </a:xfrm>
+          <a:prstGeom prst="rect">
+            <a:avLst/>
+          </a:prstGeom>
+          <a:noFill/>
+          <a:extLst>
+            <a:ext uri="{909E8E84-426E-40DD-AFC4-6F175D3DCCD1}">
+              <a14:hiddenFill xmlns:a14="http://schemas.microsoft.com/office/drawing/2010/main">
+                <a:solidFill>
+                  <a:srgbClr val="FFFFFF"/>
+                </a:solidFill>
+              </a14:hiddenFill>
+            </a:ext>
+          </a:extLst>
+        </p:spPr>
+      </p:pic>
+      <p:pic>
+        <p:nvPicPr>
+          <p:cNvPr id="1044" name="Picture 6" descr="1/8W 5%  1K OHM CF RES">
+            <a:extLst>
+              <a:ext uri="{FF2B5EF4-FFF2-40B4-BE49-F238E27FC236}">
+                <a16:creationId xmlns:a16="http://schemas.microsoft.com/office/drawing/2014/main" id="{C2C55F8D-5731-2C1B-1CB9-80CE238E8C6A}"/>
+              </a:ext>
+            </a:extLst>
+          </p:cNvPr>
+          <p:cNvPicPr>
+            <a:picLocks noChangeAspect="1" noChangeArrowheads="1"/>
+          </p:cNvPicPr>
+          <p:nvPr/>
+        </p:nvPicPr>
+        <p:blipFill rotWithShape="1">
+          <a:blip r:embed="rId3">
+            <a:extLst>
+              <a:ext uri="{28A0092B-C50C-407E-A947-70E740481C1C}">
+                <a14:useLocalDpi xmlns:a14="http://schemas.microsoft.com/office/drawing/2010/main" val="0"/>
+              </a:ext>
+            </a:extLst>
+          </a:blip>
+          <a:srcRect l="16243" t="40029" r="9680" b="46368"/>
+          <a:stretch/>
+        </p:blipFill>
+        <p:spPr bwMode="auto">
+          <a:xfrm>
+            <a:off x="5553817" y="4575237"/>
+            <a:ext cx="1832926" cy="157785"/>
+          </a:xfrm>
+          <a:prstGeom prst="rect">
+            <a:avLst/>
+          </a:prstGeom>
+          <a:noFill/>
+          <a:extLst>
+            <a:ext uri="{909E8E84-426E-40DD-AFC4-6F175D3DCCD1}">
+              <a14:hiddenFill xmlns:a14="http://schemas.microsoft.com/office/drawing/2010/main">
+                <a:solidFill>
+                  <a:srgbClr val="FFFFFF"/>
+                </a:solidFill>
+              </a14:hiddenFill>
+            </a:ext>
+          </a:extLst>
+        </p:spPr>
+      </p:pic>
+      <p:sp>
+        <p:nvSpPr>
+          <p:cNvPr id="1051" name="TextBox 1050">
+            <a:extLst>
+              <a:ext uri="{FF2B5EF4-FFF2-40B4-BE49-F238E27FC236}">
+                <a16:creationId xmlns:a16="http://schemas.microsoft.com/office/drawing/2014/main" id="{D3613892-FD8C-C91D-CD9F-6843348C4B0B}"/>
+              </a:ext>
+            </a:extLst>
+          </p:cNvPr>
+          <p:cNvSpPr txBox="1"/>
+          <p:nvPr/>
+        </p:nvSpPr>
+        <p:spPr>
+          <a:xfrm>
+            <a:off x="7062213" y="5509306"/>
+            <a:ext cx="604653" cy="523220"/>
+          </a:xfrm>
+          <a:prstGeom prst="rect">
+            <a:avLst/>
+          </a:prstGeom>
+          <a:solidFill>
+            <a:srgbClr val="FFFF00"/>
+          </a:solidFill>
+          <a:ln>
+            <a:solidFill>
+              <a:srgbClr val="FFFF00"/>
+            </a:solidFill>
+          </a:ln>
+        </p:spPr>
+        <p:txBody>
+          <a:bodyPr wrap="none" rtlCol="0">
+            <a:spAutoFit/>
+          </a:bodyPr>
+          <a:lstStyle/>
+          <a:p>
+            <a:pPr algn="ctr"/>
+            <a:r>
+              <a:rPr lang="en-US" sz="1400" dirty="0"/>
+              <a:t>A0</a:t>
+            </a:r>
+          </a:p>
+          <a:p>
+            <a:pPr algn="ctr"/>
+            <a:r>
+              <a:rPr lang="en-US" sz="1400" dirty="0"/>
+              <a:t>+3.3V</a:t>
+            </a:r>
+          </a:p>
+        </p:txBody>
+      </p:sp>
+      <p:cxnSp>
+        <p:nvCxnSpPr>
+          <p:cNvPr id="1055" name="Elbow Connector 1054">
+            <a:extLst>
+              <a:ext uri="{FF2B5EF4-FFF2-40B4-BE49-F238E27FC236}">
+                <a16:creationId xmlns:a16="http://schemas.microsoft.com/office/drawing/2014/main" id="{F093EB74-72E8-1F4B-65C4-388C9C8BA1D2}"/>
+              </a:ext>
+            </a:extLst>
+          </p:cNvPr>
+          <p:cNvCxnSpPr>
+            <a:cxnSpLocks/>
+          </p:cNvCxnSpPr>
+          <p:nvPr/>
+        </p:nvCxnSpPr>
+        <p:spPr>
+          <a:xfrm rot="5400000" flipH="1" flipV="1">
+            <a:off x="7264343" y="5106657"/>
+            <a:ext cx="247812" cy="12700"/>
+          </a:xfrm>
+          <a:prstGeom prst="bentConnector3">
+            <a:avLst>
+              <a:gd name="adj1" fmla="val 50000"/>
+            </a:avLst>
+          </a:prstGeom>
+          <a:ln w="44450" cap="flat" cmpd="sng" algn="ctr">
+            <a:solidFill>
+              <a:schemeClr val="accent2"/>
+            </a:solidFill>
+            <a:prstDash val="solid"/>
+            <a:round/>
+            <a:headEnd type="oval" w="med" len="med"/>
+            <a:tailEnd type="oval" w="med" len="med"/>
+          </a:ln>
+        </p:spPr>
+        <p:style>
+          <a:lnRef idx="0">
+            <a:scrgbClr r="0" g="0" b="0"/>
+          </a:lnRef>
+          <a:fillRef idx="0">
+            <a:scrgbClr r="0" g="0" b="0"/>
+          </a:fillRef>
+          <a:effectRef idx="0">
+            <a:scrgbClr r="0" g="0" b="0"/>
+          </a:effectRef>
+          <a:fontRef idx="minor">
+            <a:schemeClr val="tx1"/>
+          </a:fontRef>
+        </p:style>
+      </p:cxnSp>
+      <p:pic>
+        <p:nvPicPr>
+          <p:cNvPr id="1108" name="Picture 10" descr="DIP Switch- 3 Positions, 2.54mm - Pack of 5">
+            <a:extLst>
+              <a:ext uri="{FF2B5EF4-FFF2-40B4-BE49-F238E27FC236}">
+                <a16:creationId xmlns:a16="http://schemas.microsoft.com/office/drawing/2014/main" id="{0EE11437-C703-6074-8787-4CF4FDFECCF8}"/>
+              </a:ext>
+            </a:extLst>
+          </p:cNvPr>
+          <p:cNvPicPr>
+            <a:picLocks noChangeAspect="1" noChangeArrowheads="1"/>
+          </p:cNvPicPr>
+          <p:nvPr/>
+        </p:nvPicPr>
+        <p:blipFill rotWithShape="1">
+          <a:blip r:embed="rId4">
+            <a:extLst>
+              <a:ext uri="{28A0092B-C50C-407E-A947-70E740481C1C}">
+                <a14:useLocalDpi xmlns:a14="http://schemas.microsoft.com/office/drawing/2010/main" val="0"/>
+              </a:ext>
+            </a:extLst>
+          </a:blip>
+          <a:srcRect l="31168" t="29330" r="32761" b="27854"/>
+          <a:stretch/>
+        </p:blipFill>
+        <p:spPr bwMode="auto">
+          <a:xfrm rot="5400000">
+            <a:off x="5270708" y="3988326"/>
+            <a:ext cx="344347" cy="408740"/>
+          </a:xfrm>
+          <a:prstGeom prst="rect">
+            <a:avLst/>
+          </a:prstGeom>
+          <a:noFill/>
+          <a:extLst>
+            <a:ext uri="{909E8E84-426E-40DD-AFC4-6F175D3DCCD1}">
+              <a14:hiddenFill xmlns:a14="http://schemas.microsoft.com/office/drawing/2010/main">
+                <a:solidFill>
+                  <a:srgbClr val="FFFFFF"/>
+                </a:solidFill>
+              </a14:hiddenFill>
+            </a:ext>
+          </a:extLst>
+        </p:spPr>
+      </p:pic>
+      <p:cxnSp>
+        <p:nvCxnSpPr>
+          <p:cNvPr id="6" name="Elbow Connector 5">
+            <a:extLst>
+              <a:ext uri="{FF2B5EF4-FFF2-40B4-BE49-F238E27FC236}">
+                <a16:creationId xmlns:a16="http://schemas.microsoft.com/office/drawing/2014/main" id="{B32CC994-981F-B001-FEF5-78F56A81C9EB}"/>
+              </a:ext>
+            </a:extLst>
+          </p:cNvPr>
+          <p:cNvCxnSpPr>
+            <a:cxnSpLocks/>
+          </p:cNvCxnSpPr>
+          <p:nvPr/>
+        </p:nvCxnSpPr>
+        <p:spPr>
+          <a:xfrm rot="5400000" flipH="1" flipV="1">
+            <a:off x="7200574" y="4842320"/>
+            <a:ext cx="388050" cy="12700"/>
+          </a:xfrm>
+          <a:prstGeom prst="bentConnector3">
+            <a:avLst>
+              <a:gd name="adj1" fmla="val 50000"/>
+            </a:avLst>
+          </a:prstGeom>
+          <a:ln w="44450" cap="flat" cmpd="sng" algn="ctr">
+            <a:solidFill>
+              <a:schemeClr val="accent2"/>
+            </a:solidFill>
+            <a:prstDash val="solid"/>
+            <a:round/>
+            <a:headEnd type="oval" w="med" len="med"/>
+            <a:tailEnd type="oval" w="med" len="med"/>
+          </a:ln>
+        </p:spPr>
+        <p:style>
+          <a:lnRef idx="0">
+            <a:scrgbClr r="0" g="0" b="0"/>
+          </a:lnRef>
+          <a:fillRef idx="0">
+            <a:scrgbClr r="0" g="0" b="0"/>
+          </a:fillRef>
+          <a:effectRef idx="0">
+            <a:scrgbClr r="0" g="0" b="0"/>
+          </a:effectRef>
+          <a:fontRef idx="minor">
+            <a:schemeClr val="tx1"/>
+          </a:fontRef>
+        </p:style>
+      </p:cxnSp>
+    </p:spTree>
+    <p:extLst>
+      <p:ext uri="{BB962C8B-B14F-4D97-AF65-F5344CB8AC3E}">
+        <p14:creationId xmlns:p14="http://schemas.microsoft.com/office/powerpoint/2010/main" val="3052913357"/>
+      </p:ext>
+    </p:extLst>
+  </p:cSld>
+  <p:clrMapOvr>
+    <a:masterClrMapping/>
+  </p:clrMapOvr>
+</p:sld>
+</file>
+
 <file path=ppt/theme/theme1.xml><?xml version="1.0" encoding="utf-8"?>
 <a:theme xmlns:a="http://schemas.openxmlformats.org/drawingml/2006/main" name="Office Theme">
   <a:themeElements>

</xml_diff>

<commit_message>
Updated Diag for Influx and new board layout
</commit_message>
<xml_diff>
--- a/MWP.pptx
+++ b/MWP.pptx
@@ -262,7 +262,7 @@
           <a:p>
             <a:fld id="{FBDE9AF9-6803-3841-8B08-89EDB77F48DB}" type="datetimeFigureOut">
               <a:rPr lang="en-US" smtClean="0"/>
-              <a:t>11/18/24</a:t>
+              <a:t>11/21/24</a:t>
             </a:fld>
             <a:endParaRPr lang="en-US"/>
           </a:p>
@@ -460,7 +460,7 @@
           <a:p>
             <a:fld id="{FBDE9AF9-6803-3841-8B08-89EDB77F48DB}" type="datetimeFigureOut">
               <a:rPr lang="en-US" smtClean="0"/>
-              <a:t>11/18/24</a:t>
+              <a:t>11/21/24</a:t>
             </a:fld>
             <a:endParaRPr lang="en-US"/>
           </a:p>
@@ -668,7 +668,7 @@
           <a:p>
             <a:fld id="{FBDE9AF9-6803-3841-8B08-89EDB77F48DB}" type="datetimeFigureOut">
               <a:rPr lang="en-US" smtClean="0"/>
-              <a:t>11/18/24</a:t>
+              <a:t>11/21/24</a:t>
             </a:fld>
             <a:endParaRPr lang="en-US"/>
           </a:p>
@@ -866,7 +866,7 @@
           <a:p>
             <a:fld id="{FBDE9AF9-6803-3841-8B08-89EDB77F48DB}" type="datetimeFigureOut">
               <a:rPr lang="en-US" smtClean="0"/>
-              <a:t>11/18/24</a:t>
+              <a:t>11/21/24</a:t>
             </a:fld>
             <a:endParaRPr lang="en-US"/>
           </a:p>
@@ -1141,7 +1141,7 @@
           <a:p>
             <a:fld id="{FBDE9AF9-6803-3841-8B08-89EDB77F48DB}" type="datetimeFigureOut">
               <a:rPr lang="en-US" smtClean="0"/>
-              <a:t>11/18/24</a:t>
+              <a:t>11/21/24</a:t>
             </a:fld>
             <a:endParaRPr lang="en-US"/>
           </a:p>
@@ -1406,7 +1406,7 @@
           <a:p>
             <a:fld id="{FBDE9AF9-6803-3841-8B08-89EDB77F48DB}" type="datetimeFigureOut">
               <a:rPr lang="en-US" smtClean="0"/>
-              <a:t>11/18/24</a:t>
+              <a:t>11/21/24</a:t>
             </a:fld>
             <a:endParaRPr lang="en-US"/>
           </a:p>
@@ -1818,7 +1818,7 @@
           <a:p>
             <a:fld id="{FBDE9AF9-6803-3841-8B08-89EDB77F48DB}" type="datetimeFigureOut">
               <a:rPr lang="en-US" smtClean="0"/>
-              <a:t>11/18/24</a:t>
+              <a:t>11/21/24</a:t>
             </a:fld>
             <a:endParaRPr lang="en-US"/>
           </a:p>
@@ -1959,7 +1959,7 @@
           <a:p>
             <a:fld id="{FBDE9AF9-6803-3841-8B08-89EDB77F48DB}" type="datetimeFigureOut">
               <a:rPr lang="en-US" smtClean="0"/>
-              <a:t>11/18/24</a:t>
+              <a:t>11/21/24</a:t>
             </a:fld>
             <a:endParaRPr lang="en-US"/>
           </a:p>
@@ -2072,7 +2072,7 @@
           <a:p>
             <a:fld id="{FBDE9AF9-6803-3841-8B08-89EDB77F48DB}" type="datetimeFigureOut">
               <a:rPr lang="en-US" smtClean="0"/>
-              <a:t>11/18/24</a:t>
+              <a:t>11/21/24</a:t>
             </a:fld>
             <a:endParaRPr lang="en-US"/>
           </a:p>
@@ -2383,7 +2383,7 @@
           <a:p>
             <a:fld id="{FBDE9AF9-6803-3841-8B08-89EDB77F48DB}" type="datetimeFigureOut">
               <a:rPr lang="en-US" smtClean="0"/>
-              <a:t>11/18/24</a:t>
+              <a:t>11/21/24</a:t>
             </a:fld>
             <a:endParaRPr lang="en-US"/>
           </a:p>
@@ -2671,7 +2671,7 @@
           <a:p>
             <a:fld id="{FBDE9AF9-6803-3841-8B08-89EDB77F48DB}" type="datetimeFigureOut">
               <a:rPr lang="en-US" smtClean="0"/>
-              <a:t>11/18/24</a:t>
+              <a:t>11/21/24</a:t>
             </a:fld>
             <a:endParaRPr lang="en-US"/>
           </a:p>
@@ -2912,7 +2912,7 @@
           <a:p>
             <a:fld id="{FBDE9AF9-6803-3841-8B08-89EDB77F48DB}" type="datetimeFigureOut">
               <a:rPr lang="en-US" smtClean="0"/>
-              <a:t>11/18/24</a:t>
+              <a:t>11/21/24</a:t>
             </a:fld>
             <a:endParaRPr lang="en-US"/>
           </a:p>
@@ -4996,8 +4996,8 @@
         </p:nvSpPr>
         <p:spPr>
           <a:xfrm>
-            <a:off x="10967111" y="2372083"/>
-            <a:ext cx="429972" cy="3594219"/>
+            <a:off x="10967111" y="824299"/>
+            <a:ext cx="429972" cy="5142003"/>
           </a:xfrm>
           <a:prstGeom prst="downArrow">
             <a:avLst/>
@@ -7994,13 +7994,15 @@
           </p:cNvPr>
           <p:cNvCxnSpPr>
             <a:cxnSpLocks/>
+            <a:stCxn id="1040" idx="3"/>
+            <a:endCxn id="2" idx="1"/>
           </p:cNvCxnSpPr>
           <p:nvPr/>
         </p:nvCxnSpPr>
         <p:spPr>
           <a:xfrm>
-            <a:off x="10147287" y="4347500"/>
-            <a:ext cx="992472" cy="12700"/>
+            <a:off x="10303896" y="4365674"/>
+            <a:ext cx="242418" cy="772250"/>
           </a:xfrm>
           <a:prstGeom prst="bentConnector3">
             <a:avLst>
@@ -8496,6 +8498,77 @@
           </a:fontRef>
         </p:style>
       </p:cxnSp>
+      <p:sp>
+        <p:nvSpPr>
+          <p:cNvPr id="2" name="Rounded Rectangle 1">
+            <a:extLst>
+              <a:ext uri="{FF2B5EF4-FFF2-40B4-BE49-F238E27FC236}">
+                <a16:creationId xmlns:a16="http://schemas.microsoft.com/office/drawing/2014/main" id="{E4805D87-364E-1C73-DCCF-C2AE59ADD928}"/>
+              </a:ext>
+            </a:extLst>
+          </p:cNvPr>
+          <p:cNvSpPr/>
+          <p:nvPr/>
+        </p:nvSpPr>
+        <p:spPr>
+          <a:xfrm>
+            <a:off x="10546314" y="4641645"/>
+            <a:ext cx="1230325" cy="992557"/>
+          </a:xfrm>
+          <a:prstGeom prst="roundRect">
+            <a:avLst/>
+          </a:prstGeom>
+          <a:solidFill>
+            <a:schemeClr val="accent2"/>
+          </a:solidFill>
+          <a:ln>
+            <a:solidFill>
+              <a:schemeClr val="accent2"/>
+            </a:solidFill>
+          </a:ln>
+        </p:spPr>
+        <p:style>
+          <a:lnRef idx="2">
+            <a:schemeClr val="accent1">
+              <a:shade val="15000"/>
+            </a:schemeClr>
+          </a:lnRef>
+          <a:fillRef idx="1">
+            <a:schemeClr val="accent1"/>
+          </a:fillRef>
+          <a:effectRef idx="0">
+            <a:schemeClr val="accent1"/>
+          </a:effectRef>
+          <a:fontRef idx="minor">
+            <a:schemeClr val="lt1"/>
+          </a:fontRef>
+        </p:style>
+        <p:txBody>
+          <a:bodyPr rtlCol="0" anchor="ctr"/>
+          <a:lstStyle/>
+          <a:p>
+            <a:pPr algn="ctr"/>
+            <a:r>
+              <a:rPr lang="en-US" dirty="0"/>
+              <a:t>Blynk</a:t>
+            </a:r>
+          </a:p>
+          <a:p>
+            <a:pPr algn="ctr"/>
+            <a:r>
+              <a:rPr lang="en-US" dirty="0"/>
+              <a:t>Log</a:t>
+            </a:r>
+          </a:p>
+          <a:p>
+            <a:pPr algn="ctr"/>
+            <a:r>
+              <a:rPr lang="en-US" dirty="0"/>
+              <a:t>Process</a:t>
+            </a:r>
+          </a:p>
+        </p:txBody>
+      </p:sp>
     </p:spTree>
     <p:extLst>
       <p:ext uri="{BB962C8B-B14F-4D97-AF65-F5344CB8AC3E}">
@@ -12034,7 +12107,7 @@
         </p:blipFill>
         <p:spPr bwMode="auto">
           <a:xfrm>
-            <a:off x="4346397" y="2354548"/>
+            <a:off x="121239" y="73803"/>
             <a:ext cx="4144142" cy="3205017"/>
           </a:xfrm>
           <a:prstGeom prst="rect">
@@ -12068,7 +12141,7 @@
         </p:nvCxnSpPr>
         <p:spPr>
           <a:xfrm flipV="1">
-            <a:off x="5754193" y="2690648"/>
+            <a:off x="1529035" y="409903"/>
             <a:ext cx="2454386" cy="1685254"/>
           </a:xfrm>
           <a:prstGeom prst="bentConnector3">
@@ -12117,7 +12190,7 @@
         </p:nvCxnSpPr>
         <p:spPr>
           <a:xfrm rot="10800000" flipV="1">
-            <a:off x="7748150" y="4137165"/>
+            <a:off x="3522992" y="1856420"/>
             <a:ext cx="3545180" cy="65694"/>
           </a:xfrm>
           <a:prstGeom prst="bentConnector3">
@@ -12207,7 +12280,7 @@
         </p:nvCxnSpPr>
         <p:spPr>
           <a:xfrm flipV="1">
-            <a:off x="5748890" y="2686893"/>
+            <a:off x="1523732" y="406148"/>
             <a:ext cx="1850092" cy="1539137"/>
           </a:xfrm>
           <a:prstGeom prst="bentConnector3">
@@ -12256,7 +12329,7 @@
         </p:nvCxnSpPr>
         <p:spPr>
           <a:xfrm rot="5400000" flipH="1" flipV="1">
-            <a:off x="5328783" y="3110755"/>
+            <a:off x="1103625" y="830010"/>
             <a:ext cx="1355493" cy="515280"/>
           </a:xfrm>
           <a:prstGeom prst="bentConnector3">
@@ -12305,7 +12378,7 @@
         </p:nvCxnSpPr>
         <p:spPr>
           <a:xfrm rot="10800000" flipV="1">
-            <a:off x="7711502" y="3890792"/>
+            <a:off x="3486344" y="1610047"/>
             <a:ext cx="3358923" cy="161464"/>
           </a:xfrm>
           <a:prstGeom prst="bentConnector3">
@@ -12354,7 +12427,7 @@
         </p:nvCxnSpPr>
         <p:spPr>
           <a:xfrm rot="10800000" flipV="1">
-            <a:off x="7748150" y="3533275"/>
+            <a:off x="3522992" y="1252530"/>
             <a:ext cx="3133864" cy="267715"/>
           </a:xfrm>
           <a:prstGeom prst="bentConnector3">
@@ -12401,7 +12474,7 @@
         </p:nvSpPr>
         <p:spPr>
           <a:xfrm>
-            <a:off x="10362474" y="3431347"/>
+            <a:off x="6137316" y="1150602"/>
             <a:ext cx="1150535" cy="738664"/>
           </a:xfrm>
           <a:prstGeom prst="rect">
@@ -12450,7 +12523,7 @@
         </p:nvCxnSpPr>
         <p:spPr>
           <a:xfrm rot="16200000" flipV="1">
-            <a:off x="6671641" y="2756142"/>
+            <a:off x="2446483" y="475397"/>
             <a:ext cx="1104941" cy="973953"/>
           </a:xfrm>
           <a:prstGeom prst="bentConnector3">
@@ -12499,7 +12572,7 @@
         </p:nvCxnSpPr>
         <p:spPr>
           <a:xfrm rot="16200000" flipV="1">
-            <a:off x="6719837" y="3029269"/>
+            <a:off x="2494679" y="748524"/>
             <a:ext cx="1333628" cy="648875"/>
           </a:xfrm>
           <a:prstGeom prst="bentConnector3">
@@ -12546,7 +12619,7 @@
         </p:nvSpPr>
         <p:spPr>
           <a:xfrm>
-            <a:off x="7598982" y="4525439"/>
+            <a:off x="3373824" y="2244694"/>
             <a:ext cx="587020" cy="307777"/>
           </a:xfrm>
           <a:prstGeom prst="rect">
@@ -12586,7 +12659,7 @@
         </p:nvSpPr>
         <p:spPr>
           <a:xfrm>
-            <a:off x="5884741" y="4733022"/>
+            <a:off x="1659583" y="2452277"/>
             <a:ext cx="734496" cy="307777"/>
           </a:xfrm>
           <a:prstGeom prst="rect">
@@ -12639,7 +12712,7 @@
         </p:blipFill>
         <p:spPr bwMode="auto">
           <a:xfrm rot="6793647" flipV="1">
-            <a:off x="7177257" y="4512939"/>
+            <a:off x="2952099" y="2232194"/>
             <a:ext cx="797303" cy="108429"/>
           </a:xfrm>
           <a:prstGeom prst="rect">
@@ -12684,7 +12757,7 @@
         </p:blipFill>
         <p:spPr bwMode="auto">
           <a:xfrm>
-            <a:off x="5553817" y="4575237"/>
+            <a:off x="1328659" y="2294492"/>
             <a:ext cx="1832926" cy="157785"/>
           </a:xfrm>
           <a:prstGeom prst="rect">
@@ -12716,7 +12789,7 @@
         </p:nvSpPr>
         <p:spPr>
           <a:xfrm>
-            <a:off x="7062213" y="5509306"/>
+            <a:off x="2837055" y="3228561"/>
             <a:ext cx="604653" cy="523220"/>
           </a:xfrm>
           <a:prstGeom prst="rect">
@@ -12768,7 +12841,7 @@
         </p:nvCxnSpPr>
         <p:spPr>
           <a:xfrm rot="5400000" flipH="1" flipV="1">
-            <a:off x="7264343" y="5106657"/>
+            <a:off x="3039185" y="2825912"/>
             <a:ext cx="247812" cy="12700"/>
           </a:xfrm>
           <a:prstGeom prst="bentConnector3">
@@ -12828,7 +12901,7 @@
         </p:blipFill>
         <p:spPr bwMode="auto">
           <a:xfrm rot="5400000">
-            <a:off x="5270708" y="3988326"/>
+            <a:off x="1045550" y="1707581"/>
             <a:ext cx="344347" cy="408740"/>
           </a:xfrm>
           <a:prstGeom prst="rect">
@@ -12862,7 +12935,7 @@
         </p:nvCxnSpPr>
         <p:spPr>
           <a:xfrm rot="5400000" flipH="1" flipV="1">
-            <a:off x="7200574" y="4842320"/>
+            <a:off x="2975416" y="2561575"/>
             <a:ext cx="388050" cy="12700"/>
           </a:xfrm>
           <a:prstGeom prst="bentConnector3">
@@ -12873,6 +12946,404 @@
           <a:ln w="44450" cap="flat" cmpd="sng" algn="ctr">
             <a:solidFill>
               <a:schemeClr val="accent2"/>
+            </a:solidFill>
+            <a:prstDash val="solid"/>
+            <a:round/>
+            <a:headEnd type="oval" w="med" len="med"/>
+            <a:tailEnd type="oval" w="med" len="med"/>
+          </a:ln>
+        </p:spPr>
+        <p:style>
+          <a:lnRef idx="0">
+            <a:scrgbClr r="0" g="0" b="0"/>
+          </a:lnRef>
+          <a:fillRef idx="0">
+            <a:scrgbClr r="0" g="0" b="0"/>
+          </a:fillRef>
+          <a:effectRef idx="0">
+            <a:scrgbClr r="0" g="0" b="0"/>
+          </a:effectRef>
+          <a:fontRef idx="minor">
+            <a:schemeClr val="tx1"/>
+          </a:fontRef>
+        </p:style>
+      </p:cxnSp>
+      <p:pic>
+        <p:nvPicPr>
+          <p:cNvPr id="4" name="Picture 3" descr="A close-up of a circuit board&#10;&#10;Description automatically generated">
+            <a:extLst>
+              <a:ext uri="{FF2B5EF4-FFF2-40B4-BE49-F238E27FC236}">
+                <a16:creationId xmlns:a16="http://schemas.microsoft.com/office/drawing/2014/main" id="{05D2D7A4-86CA-5732-FCB5-716CA82943CE}"/>
+              </a:ext>
+            </a:extLst>
+          </p:cNvPr>
+          <p:cNvPicPr>
+            <a:picLocks noChangeAspect="1"/>
+          </p:cNvPicPr>
+          <p:nvPr/>
+        </p:nvPicPr>
+        <p:blipFill>
+          <a:blip r:embed="rId5"/>
+          <a:stretch>
+            <a:fillRect/>
+          </a:stretch>
+        </p:blipFill>
+        <p:spPr>
+          <a:xfrm>
+            <a:off x="7640692" y="3429000"/>
+            <a:ext cx="4263745" cy="3268871"/>
+          </a:xfrm>
+          <a:prstGeom prst="rect">
+            <a:avLst/>
+          </a:prstGeom>
+        </p:spPr>
+      </p:pic>
+      <p:pic>
+        <p:nvPicPr>
+          <p:cNvPr id="5" name="Picture 10" descr="DIP Switch- 3 Positions, 2.54mm - Pack of 5">
+            <a:extLst>
+              <a:ext uri="{FF2B5EF4-FFF2-40B4-BE49-F238E27FC236}">
+                <a16:creationId xmlns:a16="http://schemas.microsoft.com/office/drawing/2014/main" id="{C562ED91-DE4A-C3BB-FD15-966B7CFC5A47}"/>
+              </a:ext>
+            </a:extLst>
+          </p:cNvPr>
+          <p:cNvPicPr>
+            <a:picLocks noChangeAspect="1" noChangeArrowheads="1"/>
+          </p:cNvPicPr>
+          <p:nvPr/>
+        </p:nvPicPr>
+        <p:blipFill rotWithShape="1">
+          <a:blip r:embed="rId4">
+            <a:extLst>
+              <a:ext uri="{28A0092B-C50C-407E-A947-70E740481C1C}">
+                <a14:useLocalDpi xmlns:a14="http://schemas.microsoft.com/office/drawing/2010/main" val="0"/>
+              </a:ext>
+            </a:extLst>
+          </a:blip>
+          <a:srcRect l="31168" t="29330" r="32761" b="27854"/>
+          <a:stretch/>
+        </p:blipFill>
+        <p:spPr bwMode="auto">
+          <a:xfrm rot="10800000">
+            <a:off x="10541648" y="4581122"/>
+            <a:ext cx="344347" cy="408740"/>
+          </a:xfrm>
+          <a:prstGeom prst="rect">
+            <a:avLst/>
+          </a:prstGeom>
+          <a:noFill/>
+          <a:extLst>
+            <a:ext uri="{909E8E84-426E-40DD-AFC4-6F175D3DCCD1}">
+              <a14:hiddenFill xmlns:a14="http://schemas.microsoft.com/office/drawing/2010/main">
+                <a:solidFill>
+                  <a:srgbClr val="FFFFFF"/>
+                </a:solidFill>
+              </a14:hiddenFill>
+            </a:ext>
+          </a:extLst>
+        </p:spPr>
+      </p:pic>
+      <p:pic>
+        <p:nvPicPr>
+          <p:cNvPr id="7" name="Picture 6" descr="A green electrical device with metal pins&#10;&#10;Description automatically generated">
+            <a:extLst>
+              <a:ext uri="{FF2B5EF4-FFF2-40B4-BE49-F238E27FC236}">
+                <a16:creationId xmlns:a16="http://schemas.microsoft.com/office/drawing/2014/main" id="{0BF2F366-8944-25D7-4E66-10E87DE93085}"/>
+              </a:ext>
+            </a:extLst>
+          </p:cNvPr>
+          <p:cNvPicPr>
+            <a:picLocks noChangeAspect="1"/>
+          </p:cNvPicPr>
+          <p:nvPr/>
+        </p:nvPicPr>
+        <p:blipFill>
+          <a:blip r:embed="rId6"/>
+          <a:stretch>
+            <a:fillRect/>
+          </a:stretch>
+        </p:blipFill>
+        <p:spPr>
+          <a:xfrm rot="16200000">
+            <a:off x="11187935" y="4412151"/>
+            <a:ext cx="657224" cy="537154"/>
+          </a:xfrm>
+          <a:prstGeom prst="rect">
+            <a:avLst/>
+          </a:prstGeom>
+        </p:spPr>
+      </p:pic>
+      <p:pic>
+        <p:nvPicPr>
+          <p:cNvPr id="8" name="Picture 7" descr="A green electrical device with metal pins&#10;&#10;Description automatically generated">
+            <a:extLst>
+              <a:ext uri="{FF2B5EF4-FFF2-40B4-BE49-F238E27FC236}">
+                <a16:creationId xmlns:a16="http://schemas.microsoft.com/office/drawing/2014/main" id="{16BA4153-9059-1C68-E4B1-216514C0BD51}"/>
+              </a:ext>
+            </a:extLst>
+          </p:cNvPr>
+          <p:cNvPicPr>
+            <a:picLocks noChangeAspect="1"/>
+          </p:cNvPicPr>
+          <p:nvPr/>
+        </p:nvPicPr>
+        <p:blipFill>
+          <a:blip r:embed="rId6"/>
+          <a:stretch>
+            <a:fillRect/>
+          </a:stretch>
+        </p:blipFill>
+        <p:spPr>
+          <a:xfrm rot="16200000">
+            <a:off x="11195949" y="5256416"/>
+            <a:ext cx="657224" cy="537154"/>
+          </a:xfrm>
+          <a:prstGeom prst="rect">
+            <a:avLst/>
+          </a:prstGeom>
+        </p:spPr>
+      </p:pic>
+      <p:sp>
+        <p:nvSpPr>
+          <p:cNvPr id="9" name="TextBox 8">
+            <a:extLst>
+              <a:ext uri="{FF2B5EF4-FFF2-40B4-BE49-F238E27FC236}">
+                <a16:creationId xmlns:a16="http://schemas.microsoft.com/office/drawing/2014/main" id="{A4DA3833-9981-6EAE-3921-D3648168B947}"/>
+              </a:ext>
+            </a:extLst>
+          </p:cNvPr>
+          <p:cNvSpPr txBox="1"/>
+          <p:nvPr/>
+        </p:nvSpPr>
+        <p:spPr>
+          <a:xfrm>
+            <a:off x="11734717" y="4486120"/>
+            <a:ext cx="468398" cy="307777"/>
+          </a:xfrm>
+          <a:prstGeom prst="rect">
+            <a:avLst/>
+          </a:prstGeom>
+          <a:solidFill>
+            <a:srgbClr val="FFFF00"/>
+          </a:solidFill>
+          <a:ln>
+            <a:solidFill>
+              <a:srgbClr val="FFFF00"/>
+            </a:solidFill>
+          </a:ln>
+        </p:spPr>
+        <p:txBody>
+          <a:bodyPr wrap="none" rtlCol="0">
+            <a:spAutoFit/>
+          </a:bodyPr>
+          <a:lstStyle/>
+          <a:p>
+            <a:pPr algn="ctr"/>
+            <a:r>
+              <a:rPr lang="en-US" sz="1400" dirty="0"/>
+              <a:t>+5V</a:t>
+            </a:r>
+          </a:p>
+        </p:txBody>
+      </p:sp>
+      <p:sp>
+        <p:nvSpPr>
+          <p:cNvPr id="10" name="TextBox 9">
+            <a:extLst>
+              <a:ext uri="{FF2B5EF4-FFF2-40B4-BE49-F238E27FC236}">
+                <a16:creationId xmlns:a16="http://schemas.microsoft.com/office/drawing/2014/main" id="{035A5891-5D09-B48D-CF7B-1DD643BF8496}"/>
+              </a:ext>
+            </a:extLst>
+          </p:cNvPr>
+          <p:cNvSpPr txBox="1"/>
+          <p:nvPr/>
+        </p:nvSpPr>
+        <p:spPr>
+          <a:xfrm>
+            <a:off x="11678611" y="5438106"/>
+            <a:ext cx="524504" cy="307777"/>
+          </a:xfrm>
+          <a:prstGeom prst="rect">
+            <a:avLst/>
+          </a:prstGeom>
+          <a:solidFill>
+            <a:srgbClr val="FFFF00"/>
+          </a:solidFill>
+          <a:ln>
+            <a:solidFill>
+              <a:srgbClr val="FFFF00"/>
+            </a:solidFill>
+          </a:ln>
+        </p:spPr>
+        <p:txBody>
+          <a:bodyPr wrap="none" rtlCol="0">
+            <a:spAutoFit/>
+          </a:bodyPr>
+          <a:lstStyle/>
+          <a:p>
+            <a:pPr algn="ctr"/>
+            <a:r>
+              <a:rPr lang="en-US" sz="1400" dirty="0"/>
+              <a:t>GND</a:t>
+            </a:r>
+          </a:p>
+        </p:txBody>
+      </p:sp>
+      <p:pic>
+        <p:nvPicPr>
+          <p:cNvPr id="11" name="Picture 10" descr="A green electrical device with metal pins&#10;&#10;Description automatically generated">
+            <a:extLst>
+              <a:ext uri="{FF2B5EF4-FFF2-40B4-BE49-F238E27FC236}">
+                <a16:creationId xmlns:a16="http://schemas.microsoft.com/office/drawing/2014/main" id="{E09BF08C-C8D2-1028-E28D-40AF26509710}"/>
+              </a:ext>
+            </a:extLst>
+          </p:cNvPr>
+          <p:cNvPicPr>
+            <a:picLocks noChangeAspect="1"/>
+          </p:cNvPicPr>
+          <p:nvPr/>
+        </p:nvPicPr>
+        <p:blipFill>
+          <a:blip r:embed="rId6"/>
+          <a:stretch>
+            <a:fillRect/>
+          </a:stretch>
+        </p:blipFill>
+        <p:spPr>
+          <a:xfrm>
+            <a:off x="9358762" y="4272199"/>
+            <a:ext cx="657224" cy="537154"/>
+          </a:xfrm>
+          <a:prstGeom prst="rect">
+            <a:avLst/>
+          </a:prstGeom>
+        </p:spPr>
+      </p:pic>
+      <p:cxnSp>
+        <p:nvCxnSpPr>
+          <p:cNvPr id="13" name="Elbow Connector 12">
+            <a:extLst>
+              <a:ext uri="{FF2B5EF4-FFF2-40B4-BE49-F238E27FC236}">
+                <a16:creationId xmlns:a16="http://schemas.microsoft.com/office/drawing/2014/main" id="{DF8E4178-00F7-9227-E8B9-35C5205CC04B}"/>
+              </a:ext>
+            </a:extLst>
+          </p:cNvPr>
+          <p:cNvCxnSpPr>
+            <a:cxnSpLocks/>
+          </p:cNvCxnSpPr>
+          <p:nvPr/>
+        </p:nvCxnSpPr>
+        <p:spPr>
+          <a:xfrm rot="10800000">
+            <a:off x="9705986" y="3903380"/>
+            <a:ext cx="1162109" cy="448737"/>
+          </a:xfrm>
+          <a:prstGeom prst="bentConnector3">
+            <a:avLst>
+              <a:gd name="adj1" fmla="val 50000"/>
+            </a:avLst>
+          </a:prstGeom>
+          <a:ln w="44450" cap="flat" cmpd="sng" algn="ctr">
+            <a:solidFill>
+              <a:srgbClr val="73FB79"/>
+            </a:solidFill>
+            <a:prstDash val="solid"/>
+            <a:round/>
+            <a:headEnd type="oval" w="med" len="med"/>
+            <a:tailEnd type="oval" w="med" len="med"/>
+          </a:ln>
+        </p:spPr>
+        <p:style>
+          <a:lnRef idx="0">
+            <a:scrgbClr r="0" g="0" b="0"/>
+          </a:lnRef>
+          <a:fillRef idx="0">
+            <a:scrgbClr r="0" g="0" b="0"/>
+          </a:fillRef>
+          <a:effectRef idx="0">
+            <a:scrgbClr r="0" g="0" b="0"/>
+          </a:effectRef>
+          <a:fontRef idx="minor">
+            <a:schemeClr val="tx1"/>
+          </a:fontRef>
+        </p:style>
+      </p:cxnSp>
+      <p:cxnSp>
+        <p:nvCxnSpPr>
+          <p:cNvPr id="15" name="Elbow Connector 14">
+            <a:extLst>
+              <a:ext uri="{FF2B5EF4-FFF2-40B4-BE49-F238E27FC236}">
+                <a16:creationId xmlns:a16="http://schemas.microsoft.com/office/drawing/2014/main" id="{EBAC6BBC-AB69-C4A3-2ACD-4FC71EF531D9}"/>
+              </a:ext>
+            </a:extLst>
+          </p:cNvPr>
+          <p:cNvCxnSpPr>
+            <a:cxnSpLocks/>
+          </p:cNvCxnSpPr>
+          <p:nvPr/>
+        </p:nvCxnSpPr>
+        <p:spPr>
+          <a:xfrm flipV="1">
+            <a:off x="10621595" y="3931623"/>
+            <a:ext cx="902966" cy="554497"/>
+          </a:xfrm>
+          <a:prstGeom prst="bentConnector3">
+            <a:avLst>
+              <a:gd name="adj1" fmla="val 50000"/>
+            </a:avLst>
+          </a:prstGeom>
+          <a:ln w="44450" cap="flat" cmpd="sng" algn="ctr">
+            <a:solidFill>
+              <a:srgbClr val="73FB79"/>
+            </a:solidFill>
+            <a:prstDash val="solid"/>
+            <a:round/>
+            <a:headEnd type="oval" w="med" len="med"/>
+            <a:tailEnd type="oval" w="med" len="med"/>
+          </a:ln>
+        </p:spPr>
+        <p:style>
+          <a:lnRef idx="0">
+            <a:scrgbClr r="0" g="0" b="0"/>
+          </a:lnRef>
+          <a:fillRef idx="0">
+            <a:scrgbClr r="0" g="0" b="0"/>
+          </a:fillRef>
+          <a:effectRef idx="0">
+            <a:scrgbClr r="0" g="0" b="0"/>
+          </a:effectRef>
+          <a:fontRef idx="minor">
+            <a:schemeClr val="tx1"/>
+          </a:fontRef>
+        </p:style>
+      </p:cxnSp>
+      <p:cxnSp>
+        <p:nvCxnSpPr>
+          <p:cNvPr id="17" name="Elbow Connector 16">
+            <a:extLst>
+              <a:ext uri="{FF2B5EF4-FFF2-40B4-BE49-F238E27FC236}">
+                <a16:creationId xmlns:a16="http://schemas.microsoft.com/office/drawing/2014/main" id="{B01C1B2B-57D6-5839-24C4-6E7C30C10545}"/>
+              </a:ext>
+            </a:extLst>
+          </p:cNvPr>
+          <p:cNvCxnSpPr>
+            <a:cxnSpLocks/>
+          </p:cNvCxnSpPr>
+          <p:nvPr/>
+        </p:nvCxnSpPr>
+        <p:spPr>
+          <a:xfrm rot="5400000" flipH="1" flipV="1">
+            <a:off x="10695545" y="3971668"/>
+            <a:ext cx="277248" cy="227643"/>
+          </a:xfrm>
+          <a:prstGeom prst="bentConnector3">
+            <a:avLst>
+              <a:gd name="adj1" fmla="val 50000"/>
+            </a:avLst>
+          </a:prstGeom>
+          <a:ln w="44450" cap="flat" cmpd="sng" algn="ctr">
+            <a:solidFill>
+              <a:srgbClr val="73FB79"/>
             </a:solidFill>
             <a:prstDash val="solid"/>
             <a:round/>

</xml_diff>